<commit_message>
update imgs and Pre
</commit_message>
<xml_diff>
--- a/lttStudy/ProposalPre.pptx
+++ b/lttStudy/ProposalPre.pptx
@@ -14,13 +14,12 @@
     <p:sldId id="411" r:id="rId7"/>
     <p:sldId id="414" r:id="rId8"/>
     <p:sldId id="416" r:id="rId9"/>
-    <p:sldId id="417" r:id="rId10"/>
-    <p:sldId id="419" r:id="rId11"/>
-    <p:sldId id="418" r:id="rId12"/>
-    <p:sldId id="423" r:id="rId13"/>
-    <p:sldId id="422" r:id="rId14"/>
-    <p:sldId id="424" r:id="rId15"/>
-    <p:sldId id="413" r:id="rId16"/>
+    <p:sldId id="419" r:id="rId10"/>
+    <p:sldId id="418" r:id="rId11"/>
+    <p:sldId id="423" r:id="rId12"/>
+    <p:sldId id="422" r:id="rId13"/>
+    <p:sldId id="424" r:id="rId14"/>
+    <p:sldId id="413" r:id="rId15"/>
   </p:sldIdLst>
   <p:sldSz cx="12192000" cy="6858000"/>
   <p:notesSz cx="6858000" cy="9144000"/>
@@ -556,55 +555,10 @@
           <a:bodyPr/>
           <a:p>
             <a:r>
-              <a:rPr lang="en-US" altLang="zh-CN">
-                <a:sym typeface="+mn-ea"/>
-              </a:rPr>
-              <a:t>Devices in the system will be callled nodes later.</a:t>
-            </a:r>
-            <a:endParaRPr lang="en-US" altLang="zh-CN">
-              <a:sym typeface="+mn-ea"/>
-            </a:endParaRPr>
-          </a:p>
-          <a:p>
-            <a:r>
-              <a:rPr lang="en-US" altLang="zh-CN">
-                <a:sym typeface="+mn-ea"/>
-              </a:rPr>
-              <a:t>The purpose of the server side is to find out Sybil(virtual) nodes.(explain the model)</a:t>
-            </a:r>
-            <a:endParaRPr lang="en-US" altLang="zh-CN">
-              <a:sym typeface="+mn-ea"/>
-            </a:endParaRPr>
-          </a:p>
-          <a:p>
-            <a:r>
-              <a:rPr lang="en-US" altLang="zh-CN">
-                <a:sym typeface="+mn-ea"/>
-              </a:rPr>
-              <a:t>There are 2*log(n) rounds in total.</a:t>
+              <a:rPr lang="en-US" altLang="zh-CN"/>
+              <a:t>If Clients passed the device self check, then they can spoofed the data as their will. (Software exploited)</a:t>
             </a:r>
             <a:endParaRPr lang="en-US" altLang="zh-CN"/>
-          </a:p>
-          <a:p>
-            <a:r>
-              <a:rPr lang="en-US" altLang="zh-CN">
-                <a:sym typeface="+mn-ea"/>
-              </a:rPr>
-              <a:t>Each round, half of the node would broadcast and the rest would receive.</a:t>
-            </a:r>
-            <a:endParaRPr lang="en-US" altLang="zh-CN"/>
-          </a:p>
-          <a:p>
-            <a:r>
-              <a:rPr lang="en-US" altLang="zh-CN">
-                <a:sym typeface="+mn-ea"/>
-              </a:rPr>
-              <a:t>Nodes in the system would broadcast in turn so that each node would get the secret keys from all other nodes.</a:t>
-            </a:r>
-            <a:endParaRPr lang="en-US" altLang="zh-CN"/>
-          </a:p>
-          <a:p>
-            <a:endParaRPr lang="zh-CN" altLang="en-US"/>
           </a:p>
         </p:txBody>
       </p:sp>
@@ -649,24 +603,93 @@
           <a:bodyPr/>
           <a:p>
             <a:r>
-              <a:rPr lang="en-US" altLang="zh-CN"/>
-              <a:t>With two nodes, we could determine whether there are nodes broadcasting with the same AP in the same round</a:t>
+              <a:rPr lang="en-US" altLang="zh-CN">
+                <a:sym typeface="+mn-ea"/>
+              </a:rPr>
+              <a:t>Model:</a:t>
+            </a:r>
+            <a:endParaRPr lang="en-US" altLang="zh-CN">
+              <a:sym typeface="+mn-ea"/>
+            </a:endParaRPr>
+          </a:p>
+          <a:p>
+            <a:r>
+              <a:rPr lang="en-US" altLang="zh-CN">
+                <a:sym typeface="+mn-ea"/>
+              </a:rPr>
+              <a:t>we are going to build a score system. Nodes would get scores after some procedures. Elimination would be based on score.</a:t>
+            </a:r>
+            <a:endParaRPr lang="en-US" altLang="zh-CN">
+              <a:sym typeface="+mn-ea"/>
+            </a:endParaRPr>
+          </a:p>
+          <a:p>
+            <a:r>
+              <a:rPr lang="en-US" altLang="zh-CN">
+                <a:sym typeface="+mn-ea"/>
+              </a:rPr>
+              <a:t>There are some threats we have considered to such score system: Attacker could frame legitimate users</a:t>
+            </a:r>
+            <a:endParaRPr lang="en-US" altLang="zh-CN">
+              <a:sym typeface="+mn-ea"/>
+            </a:endParaRPr>
+          </a:p>
+          <a:p>
+            <a:endParaRPr lang="en-US" altLang="zh-CN">
+              <a:sym typeface="+mn-ea"/>
+            </a:endParaRPr>
+          </a:p>
+          <a:p>
+            <a:r>
+              <a:rPr lang="en-US" altLang="zh-CN">
+                <a:sym typeface="+mn-ea"/>
+              </a:rPr>
+              <a:t>Devices in the system will be callled nodes later.</a:t>
+            </a:r>
+            <a:endParaRPr lang="en-US" altLang="zh-CN">
+              <a:sym typeface="+mn-ea"/>
+            </a:endParaRPr>
+          </a:p>
+          <a:p>
+            <a:r>
+              <a:rPr lang="en-US" altLang="zh-CN">
+                <a:sym typeface="+mn-ea"/>
+              </a:rPr>
+              <a:t>The purpose of the server side is to find out Sybil(virtual) nodes.(explain the model)</a:t>
+            </a:r>
+            <a:endParaRPr lang="en-US" altLang="zh-CN">
+              <a:sym typeface="+mn-ea"/>
+            </a:endParaRPr>
+          </a:p>
+          <a:p>
+            <a:r>
+              <a:rPr lang="en-US" altLang="zh-CN">
+                <a:sym typeface="+mn-ea"/>
+              </a:rPr>
+              <a:t>There are 2*log(n) rounds in total.</a:t>
             </a:r>
             <a:endParaRPr lang="en-US" altLang="zh-CN"/>
           </a:p>
           <a:p>
             <a:r>
-              <a:rPr lang="en-US" altLang="zh-CN"/>
-              <a:t>Later, we are going to use node pairs to find out potential Sybil nodes.</a:t>
+              <a:rPr lang="en-US" altLang="zh-CN">
+                <a:sym typeface="+mn-ea"/>
+              </a:rPr>
+              <a:t>Each round, half of the node would broadcast and the rest would receive.</a:t>
             </a:r>
             <a:endParaRPr lang="en-US" altLang="zh-CN"/>
           </a:p>
           <a:p>
             <a:r>
-              <a:rPr lang="en-US" altLang="zh-CN"/>
-              <a:t>These pairs would be called as sentry.</a:t>
+              <a:rPr lang="en-US" altLang="zh-CN">
+                <a:sym typeface="+mn-ea"/>
+              </a:rPr>
+              <a:t>Nodes in the system would broadcast in turn so that each node would get the secret keys from all other nodes.</a:t>
             </a:r>
             <a:endParaRPr lang="en-US" altLang="zh-CN"/>
+          </a:p>
+          <a:p>
+            <a:endParaRPr lang="zh-CN" altLang="en-US"/>
           </a:p>
         </p:txBody>
       </p:sp>
@@ -712,18 +735,22 @@
           <a:p>
             <a:r>
               <a:rPr lang="en-US" altLang="zh-CN"/>
-              <a:t>From listeners, nodes are randomly divided into pairs, each pair is called a sentry. </a:t>
+              <a:t>With two nodes, we could determine whether there are nodes broadcasting with the same AP in the same round</a:t>
             </a:r>
             <a:endParaRPr lang="en-US" altLang="zh-CN"/>
           </a:p>
           <a:p>
             <a:r>
               <a:rPr lang="en-US" altLang="zh-CN"/>
-              <a:t>Since each sentry has two nodes, it can detect Sybil nodes with RSSI ratio value. </a:t>
+              <a:t>Later, we are going to use node pairs to find out potential Sybil nodes.</a:t>
             </a:r>
             <a:endParaRPr lang="en-US" altLang="zh-CN"/>
           </a:p>
           <a:p>
+            <a:r>
+              <a:rPr lang="en-US" altLang="zh-CN"/>
+              <a:t>These pairs would be called as sentry.</a:t>
+            </a:r>
             <a:endParaRPr lang="en-US" altLang="zh-CN"/>
           </a:p>
         </p:txBody>
@@ -770,11 +797,127 @@
           <a:p>
             <a:r>
               <a:rPr lang="en-US" altLang="zh-CN"/>
+              <a:t>From listeners, nodes are randomly divided into pairs, each pair is called a sentry. </a:t>
+            </a:r>
+            <a:endParaRPr lang="en-US" altLang="zh-CN"/>
+          </a:p>
+          <a:p>
+            <a:r>
+              <a:rPr lang="en-US" altLang="zh-CN"/>
+              <a:t>Since each sentry has two nodes, it can detect Sybil nodes with RSSI ratio value. </a:t>
+            </a:r>
+            <a:endParaRPr lang="en-US" altLang="zh-CN"/>
+          </a:p>
+          <a:p>
+            <a:r>
+              <a:rPr lang="en-US" altLang="zh-CN"/>
+              <a:t>Aforementioned score system, every node would get a score in the end, explain how nodes get scores.</a:t>
+            </a:r>
+            <a:endParaRPr lang="en-US" altLang="zh-CN"/>
+          </a:p>
+          <a:p>
+            <a:endParaRPr lang="en-US" altLang="zh-CN"/>
+          </a:p>
+          <a:p>
+            <a:endParaRPr lang="en-US" altLang="zh-CN"/>
+          </a:p>
+        </p:txBody>
+      </p:sp>
+    </p:spTree>
+  </p:cSld>
+  <p:clrMapOvr>
+    <a:masterClrMapping/>
+  </p:clrMapOvr>
+</p:notes>
+</file>
+
+<file path=ppt/notesSlides/notesSlide6.xml><?xml version="1.0" encoding="utf-8"?>
+<p:notes xmlns:a="http://schemas.openxmlformats.org/drawingml/2006/main" xmlns:r="http://schemas.openxmlformats.org/officeDocument/2006/relationships" xmlns:p="http://schemas.openxmlformats.org/presentationml/2006/main">
+  <p:cSld>
+    <p:spTree>
+      <p:nvGrpSpPr>
+        <p:cNvPr id="1" name=""/>
+        <p:cNvGrpSpPr/>
+        <p:nvPr/>
+      </p:nvGrpSpPr>
+      <p:grpSpPr/>
+      <p:sp>
+        <p:nvSpPr>
+          <p:cNvPr id="2" name="幻灯片图像占位符 1"/>
+          <p:cNvSpPr/>
+          <p:nvPr>
+            <p:ph type="sldImg" idx="2"/>
+          </p:nvPr>
+        </p:nvSpPr>
+        <p:spPr/>
+      </p:sp>
+      <p:sp>
+        <p:nvSpPr>
+          <p:cNvPr id="3" name="文本占位符 2"/>
+          <p:cNvSpPr/>
+          <p:nvPr>
+            <p:ph type="body" idx="3"/>
+          </p:nvPr>
+        </p:nvSpPr>
+        <p:spPr/>
+        <p:txBody>
+          <a:bodyPr/>
+          <a:p>
+            <a:r>
+              <a:rPr lang="en-US" altLang="zh-CN"/>
               <a:t>What’s colluders?</a:t>
             </a:r>
             <a:endParaRPr lang="en-US" altLang="zh-CN"/>
           </a:p>
           <a:p>
+            <a:endParaRPr lang="en-US" altLang="zh-CN"/>
+          </a:p>
+        </p:txBody>
+      </p:sp>
+    </p:spTree>
+  </p:cSld>
+  <p:clrMapOvr>
+    <a:masterClrMapping/>
+  </p:clrMapOvr>
+</p:notes>
+</file>
+
+<file path=ppt/notesSlides/notesSlide7.xml><?xml version="1.0" encoding="utf-8"?>
+<p:notes xmlns:a="http://schemas.openxmlformats.org/drawingml/2006/main" xmlns:r="http://schemas.openxmlformats.org/officeDocument/2006/relationships" xmlns:p="http://schemas.openxmlformats.org/presentationml/2006/main">
+  <p:cSld>
+    <p:spTree>
+      <p:nvGrpSpPr>
+        <p:cNvPr id="1" name=""/>
+        <p:cNvGrpSpPr/>
+        <p:nvPr/>
+      </p:nvGrpSpPr>
+      <p:grpSpPr/>
+      <p:sp>
+        <p:nvSpPr>
+          <p:cNvPr id="2" name="幻灯片图像占位符 1"/>
+          <p:cNvSpPr/>
+          <p:nvPr>
+            <p:ph type="sldImg" idx="2"/>
+          </p:nvPr>
+        </p:nvSpPr>
+        <p:spPr/>
+      </p:sp>
+      <p:sp>
+        <p:nvSpPr>
+          <p:cNvPr id="3" name="文本占位符 2"/>
+          <p:cNvSpPr/>
+          <p:nvPr>
+            <p:ph type="body" idx="3"/>
+          </p:nvPr>
+        </p:nvSpPr>
+        <p:spPr/>
+        <p:txBody>
+          <a:bodyPr/>
+          <a:p>
+            <a:r>
+              <a:rPr lang="en-US" altLang="zh-CN"/>
+              <a:t>The node with the highest score doesn’t frame others.</a:t>
+            </a:r>
             <a:endParaRPr lang="en-US" altLang="zh-CN"/>
           </a:p>
         </p:txBody>
@@ -5165,148 +5308,6 @@
         </p:nvSpPr>
         <p:spPr>
           <a:xfrm>
-            <a:off x="387350" y="259080"/>
-            <a:ext cx="3891280" cy="460375"/>
-          </a:xfrm>
-          <a:prstGeom prst="rect">
-            <a:avLst/>
-          </a:prstGeom>
-          <a:noFill/>
-        </p:spPr>
-        <p:txBody>
-          <a:bodyPr wrap="square" rtlCol="0">
-            <a:spAutoFit/>
-          </a:bodyPr>
-          <a:p>
-            <a:r>
-              <a:rPr lang="en-US" altLang="zh-CN" sz="2400" b="1"/>
-              <a:t>Simulation model</a:t>
-            </a:r>
-            <a:endParaRPr lang="en-US" altLang="zh-CN" sz="2400" b="1"/>
-          </a:p>
-        </p:txBody>
-      </p:sp>
-      <p:sp>
-        <p:nvSpPr>
-          <p:cNvPr id="6" name="文本框 5"/>
-          <p:cNvSpPr txBox="1"/>
-          <p:nvPr/>
-        </p:nvSpPr>
-        <p:spPr>
-          <a:xfrm>
-            <a:off x="387350" y="845185"/>
-            <a:ext cx="4656455" cy="5323205"/>
-          </a:xfrm>
-          <a:prstGeom prst="rect">
-            <a:avLst/>
-          </a:prstGeom>
-          <a:noFill/>
-        </p:spPr>
-        <p:txBody>
-          <a:bodyPr wrap="square" rtlCol="0">
-            <a:spAutoFit/>
-          </a:bodyPr>
-          <a:p>
-            <a:pPr marL="342900" indent="-342900">
-              <a:buFont typeface="Arial" panose="020B0604020202020204" pitchFamily="34" charset="0"/>
-              <a:buChar char="•"/>
-            </a:pPr>
-            <a:r>
-              <a:rPr lang="en-US" altLang="zh-CN" sz="2000"/>
-              <a:t>There are 16 nodes in total in the system. </a:t>
-            </a:r>
-            <a:endParaRPr lang="en-US" altLang="zh-CN" sz="2000"/>
-          </a:p>
-          <a:p>
-            <a:pPr marL="342900" indent="-342900">
-              <a:buFont typeface="Arial" panose="020B0604020202020204" pitchFamily="34" charset="0"/>
-              <a:buChar char="•"/>
-            </a:pPr>
-            <a:r>
-              <a:rPr lang="en-US" altLang="zh-CN" sz="2000"/>
-              <a:t>There is only one attacker in the system. He owns one laptop and one exploited mobile device. </a:t>
-            </a:r>
-            <a:endParaRPr lang="en-US" altLang="zh-CN" sz="2000"/>
-          </a:p>
-          <a:p>
-            <a:pPr marL="342900" indent="-342900">
-              <a:buFont typeface="Arial" panose="020B0604020202020204" pitchFamily="34" charset="0"/>
-              <a:buChar char="•"/>
-            </a:pPr>
-            <a:r>
-              <a:rPr lang="en-US" altLang="zh-CN" sz="2000">
-                <a:solidFill>
-                  <a:srgbClr val="FF0000"/>
-                </a:solidFill>
-              </a:rPr>
-              <a:t>The malicious node will only help Sybil nodes broadcast when it's vacant. The laptop can broadcast on behalf of discretionary number of Sybil nodes.</a:t>
-            </a:r>
-            <a:endParaRPr lang="en-US" altLang="zh-CN" sz="2000"/>
-          </a:p>
-          <a:p>
-            <a:pPr marL="342900" indent="-342900">
-              <a:buFont typeface="Arial" panose="020B0604020202020204" pitchFamily="34" charset="0"/>
-              <a:buChar char="•"/>
-            </a:pPr>
-            <a:r>
-              <a:rPr lang="en-US" altLang="zh-CN" sz="2000"/>
-              <a:t>When two evil nodes are paired as a sentry, they will definitely vote out broadcasting honest nodes.</a:t>
-            </a:r>
-            <a:endParaRPr lang="en-US" altLang="zh-CN" sz="2000"/>
-          </a:p>
-          <a:p>
-            <a:pPr marL="342900" indent="-342900">
-              <a:buFont typeface="Arial" panose="020B0604020202020204" pitchFamily="34" charset="0"/>
-              <a:buChar char="•"/>
-            </a:pPr>
-            <a:r>
-              <a:rPr lang="en-US" altLang="zh-CN" sz="2000"/>
-              <a:t>There are 6 evil nodes in the system(one malicious node and five Sybil nodes).</a:t>
-            </a:r>
-            <a:endParaRPr lang="en-US" altLang="zh-CN" sz="2000"/>
-          </a:p>
-          <a:p>
-            <a:pPr marL="342900" indent="-342900">
-              <a:buFont typeface="Arial" panose="020B0604020202020204" pitchFamily="34" charset="0"/>
-              <a:buChar char="•"/>
-            </a:pPr>
-            <a:r>
-              <a:rPr lang="en-US" altLang="zh-CN" sz="2000"/>
-              <a:t>The emulation runs 2000 times.</a:t>
-            </a:r>
-            <a:endParaRPr lang="en-US" altLang="zh-CN" sz="2000"/>
-          </a:p>
-        </p:txBody>
-      </p:sp>
-    </p:spTree>
-    <p:custDataLst>
-      <p:tags r:id="rId1"/>
-    </p:custDataLst>
-  </p:cSld>
-  <p:clrMapOvr>
-    <a:masterClrMapping/>
-  </p:clrMapOvr>
-</p:sld>
-</file>
-
-<file path=ppt/slides/slide11.xml><?xml version="1.0" encoding="utf-8"?>
-<p:sld xmlns:a="http://schemas.openxmlformats.org/drawingml/2006/main" xmlns:r="http://schemas.openxmlformats.org/officeDocument/2006/relationships" xmlns:p="http://schemas.openxmlformats.org/presentationml/2006/main">
-  <p:cSld>
-    <p:spTree>
-      <p:nvGrpSpPr>
-        <p:cNvPr id="1" name=""/>
-        <p:cNvGrpSpPr/>
-        <p:nvPr/>
-      </p:nvGrpSpPr>
-      <p:grpSpPr/>
-      <p:sp>
-        <p:nvSpPr>
-          <p:cNvPr id="4" name="文本框 3"/>
-          <p:cNvSpPr txBox="1"/>
-          <p:nvPr/>
-        </p:nvSpPr>
-        <p:spPr>
-          <a:xfrm>
             <a:off x="333375" y="142240"/>
             <a:ext cx="4689475" cy="460375"/>
           </a:xfrm>
@@ -5488,7 +5489,7 @@
                             <a:srgbClr val="FF0000"/>
                           </a:solidFill>
                         </a:rPr>
-                        <a:t>i</a:t>
+                        <a:t>1</a:t>
                       </a:r>
                       <a:endParaRPr lang="en-US" altLang="zh-CN">
                         <a:solidFill>
@@ -5508,7 +5509,7 @@
                       </a:pPr>
                       <a:r>
                         <a:rPr lang="en-US" altLang="zh-CN"/>
-                        <a:t>ii</a:t>
+                        <a:t>2</a:t>
                       </a:r>
                       <a:endParaRPr lang="en-US" altLang="zh-CN"/>
                     </a:p>
@@ -5524,7 +5525,7 @@
                       </a:pPr>
                       <a:r>
                         <a:rPr lang="en-US" altLang="zh-CN"/>
-                        <a:t>iii</a:t>
+                        <a:t>3</a:t>
                       </a:r>
                       <a:endParaRPr lang="en-US" altLang="zh-CN"/>
                     </a:p>
@@ -5544,7 +5545,7 @@
                             <a:srgbClr val="FF0000"/>
                           </a:solidFill>
                         </a:rPr>
-                        <a:t>iv</a:t>
+                        <a:t>4</a:t>
                       </a:r>
                       <a:endParaRPr lang="en-US" altLang="zh-CN">
                         <a:solidFill>
@@ -5564,7 +5565,7 @@
                       </a:pPr>
                       <a:r>
                         <a:rPr lang="en-US" altLang="zh-CN"/>
-                        <a:t>v</a:t>
+                        <a:t>5</a:t>
                       </a:r>
                       <a:endParaRPr lang="en-US" altLang="zh-CN"/>
                     </a:p>
@@ -5580,7 +5581,7 @@
                       </a:pPr>
                       <a:r>
                         <a:rPr lang="en-US" altLang="zh-CN"/>
-                        <a:t>vi</a:t>
+                        <a:t>6</a:t>
                       </a:r>
                       <a:endParaRPr lang="en-US" altLang="zh-CN"/>
                     </a:p>
@@ -5600,7 +5601,7 @@
                             <a:srgbClr val="FF0000"/>
                           </a:solidFill>
                         </a:rPr>
-                        <a:t>vii</a:t>
+                        <a:t>7</a:t>
                       </a:r>
                       <a:endParaRPr lang="en-US" altLang="zh-CN">
                         <a:solidFill>
@@ -5620,7 +5621,7 @@
                       </a:pPr>
                       <a:r>
                         <a:rPr lang="en-US" altLang="zh-CN"/>
-                        <a:t>viii</a:t>
+                        <a:t>8</a:t>
                       </a:r>
                       <a:endParaRPr lang="en-US" altLang="zh-CN"/>
                     </a:p>
@@ -5762,6 +5763,55 @@
           </a:graphicData>
         </a:graphic>
       </p:graphicFrame>
+      <p:sp>
+        <p:nvSpPr>
+          <p:cNvPr id="6" name="文本框 5"/>
+          <p:cNvSpPr txBox="1"/>
+          <p:nvPr/>
+        </p:nvSpPr>
+        <p:spPr>
+          <a:xfrm>
+            <a:off x="578485" y="5944235"/>
+            <a:ext cx="5365115" cy="368300"/>
+          </a:xfrm>
+          <a:prstGeom prst="rect">
+            <a:avLst/>
+          </a:prstGeom>
+          <a:noFill/>
+        </p:spPr>
+        <p:txBody>
+          <a:bodyPr wrap="square" rtlCol="0">
+            <a:spAutoFit/>
+          </a:bodyPr>
+          <a:p>
+            <a:r>
+              <a:rPr lang="en-US" altLang="zh-CN"/>
+              <a:t>Avg Scores:  N</a:t>
+            </a:r>
+            <a:r>
+              <a:rPr lang="zh-CN" altLang="en-US"/>
+              <a:t>ormal</a:t>
+            </a:r>
+            <a:r>
+              <a:rPr lang="en-US" altLang="zh-CN"/>
+              <a:t>:</a:t>
+            </a:r>
+            <a:r>
+              <a:rPr lang="zh-CN" altLang="en-US"/>
+              <a:t> 2.2865 </a:t>
+            </a:r>
+            <a:r>
+              <a:rPr lang="en-US" altLang="zh-CN"/>
+              <a:t>  S</a:t>
+            </a:r>
+            <a:r>
+              <a:rPr lang="zh-CN" altLang="en-US"/>
+              <a:t>ybil: 5.5165</a:t>
+            </a:r>
+            <a:endParaRPr lang="zh-CN" altLang="en-US"/>
+          </a:p>
+        </p:txBody>
+      </p:sp>
     </p:spTree>
     <p:custDataLst>
       <p:tags r:id="rId3"/>
@@ -5968,7 +6018,7 @@
 </p:sld>
 </file>
 
-<file path=ppt/slides/slide12.xml><?xml version="1.0" encoding="utf-8"?>
+<file path=ppt/slides/slide11.xml><?xml version="1.0" encoding="utf-8"?>
 <p:sld xmlns:a="http://schemas.openxmlformats.org/drawingml/2006/main" xmlns:r="http://schemas.openxmlformats.org/officeDocument/2006/relationships" xmlns:p="http://schemas.openxmlformats.org/presentationml/2006/main">
   <p:cSld>
     <p:spTree>
@@ -6617,7 +6667,7 @@
 </p:sld>
 </file>
 
-<file path=ppt/slides/slide13.xml><?xml version="1.0" encoding="utf-8"?>
+<file path=ppt/slides/slide12.xml><?xml version="1.0" encoding="utf-8"?>
 <p:sld xmlns:a="http://schemas.openxmlformats.org/drawingml/2006/main" xmlns:r="http://schemas.openxmlformats.org/officeDocument/2006/relationships" xmlns:p="http://schemas.openxmlformats.org/presentationml/2006/main">
   <p:cSld>
     <p:spTree>
@@ -6932,7 +6982,7 @@
         <p:spPr>
           <a:xfrm>
             <a:off x="710565" y="1177925"/>
-            <a:ext cx="5699125" cy="2306955"/>
+            <a:ext cx="5699125" cy="2584450"/>
           </a:xfrm>
           <a:prstGeom prst="rect">
             <a:avLst/>
@@ -6966,7 +7016,7 @@
           <a:p>
             <a:r>
               <a:rPr lang="en-US" altLang="zh-CN"/>
-              <a:t>e.g. Google Map</a:t>
+              <a:t>e.g. Google Map, Air quality detection with vehicle sensors</a:t>
             </a:r>
             <a:endParaRPr lang="en-US" altLang="zh-CN"/>
           </a:p>
@@ -7298,7 +7348,7 @@
           <a:p>
             <a:r>
               <a:rPr lang="en-US" altLang="zh-CN" sz="2400" b="1"/>
-              <a:t>Example for information collection</a:t>
+              <a:t>Possible information collection</a:t>
             </a:r>
             <a:endParaRPr lang="en-US" altLang="zh-CN" sz="2400" b="1"/>
           </a:p>
@@ -7699,7 +7749,7 @@
                   </a:outerShdw>
                 </a:effectLst>
               </a:rPr>
-              <a:t>HRP</a:t>
+              <a:t>HRP+</a:t>
             </a:r>
             <a:endParaRPr lang="en-US" altLang="zh-CN" sz="2400">
               <a:solidFill>
@@ -7768,49 +7818,9 @@
           <a:p>
             <a:r>
               <a:rPr lang="en-US" altLang="zh-CN" sz="2000"/>
-              <a:t>Server[4]</a:t>
+              <a:t>Server</a:t>
             </a:r>
             <a:endParaRPr lang="en-US" altLang="zh-CN" sz="2000"/>
-          </a:p>
-        </p:txBody>
-      </p:sp>
-      <p:sp>
-        <p:nvSpPr>
-          <p:cNvPr id="9" name="左大括号 8"/>
-          <p:cNvSpPr/>
-          <p:nvPr/>
-        </p:nvSpPr>
-        <p:spPr>
-          <a:xfrm>
-            <a:off x="4771390" y="865505"/>
-            <a:ext cx="298450" cy="1476375"/>
-          </a:xfrm>
-          <a:prstGeom prst="leftBrace">
-            <a:avLst>
-              <a:gd name="adj1" fmla="val 8333"/>
-              <a:gd name="adj2" fmla="val 29647"/>
-            </a:avLst>
-          </a:prstGeom>
-        </p:spPr>
-        <p:style>
-          <a:lnRef idx="1">
-            <a:schemeClr val="accent1"/>
-          </a:lnRef>
-          <a:fillRef idx="0">
-            <a:schemeClr val="accent1"/>
-          </a:fillRef>
-          <a:effectRef idx="0">
-            <a:schemeClr val="accent1"/>
-          </a:effectRef>
-          <a:fontRef idx="minor">
-            <a:schemeClr val="tx1"/>
-          </a:fontRef>
-        </p:style>
-        <p:txBody>
-          <a:bodyPr rtlCol="0" anchor="ctr"/>
-          <a:p>
-            <a:pPr algn="ctr"/>
-            <a:endParaRPr lang="zh-CN" altLang="en-US"/>
           </a:p>
         </p:txBody>
       </p:sp>
@@ -7822,8 +7832,8 @@
         </p:nvSpPr>
         <p:spPr>
           <a:xfrm>
-            <a:off x="5243830" y="865505"/>
-            <a:ext cx="3801745" cy="1476375"/>
+            <a:off x="4849495" y="967740"/>
+            <a:ext cx="3801745" cy="645160"/>
           </a:xfrm>
           <a:prstGeom prst="rect">
             <a:avLst/>
@@ -7839,10 +7849,6 @@
               <a:buFont typeface="Arial" panose="020B0604020202020204" pitchFamily="34" charset="0"/>
               <a:buChar char="•"/>
             </a:pPr>
-            <a:r>
-              <a:rPr lang="en-US" altLang="zh-CN"/>
-              <a:t>Sensors working properly</a:t>
-            </a:r>
             <a:endParaRPr lang="en-US" altLang="zh-CN"/>
           </a:p>
           <a:p>
@@ -7850,34 +7856,9 @@
               <a:buFont typeface="Arial" panose="020B0604020202020204" pitchFamily="34" charset="0"/>
               <a:buChar char="•"/>
             </a:pPr>
-            <a:endParaRPr lang="en-US" altLang="zh-CN"/>
-          </a:p>
-          <a:p>
-            <a:pPr marL="285750" indent="-285750">
-              <a:buFont typeface="Arial" panose="020B0604020202020204" pitchFamily="34" charset="0"/>
-              <a:buChar char="•"/>
-            </a:pPr>
             <a:r>
               <a:rPr lang="en-US" altLang="zh-CN"/>
-              <a:t>Hardware are not exploited</a:t>
-            </a:r>
-            <a:endParaRPr lang="en-US" altLang="zh-CN"/>
-          </a:p>
-          <a:p>
-            <a:pPr marL="285750" indent="-285750">
-              <a:buFont typeface="Arial" panose="020B0604020202020204" pitchFamily="34" charset="0"/>
-              <a:buChar char="•"/>
-            </a:pPr>
-            <a:endParaRPr lang="en-US" altLang="zh-CN"/>
-          </a:p>
-          <a:p>
-            <a:pPr marL="285750" indent="-285750">
-              <a:buFont typeface="Arial" panose="020B0604020202020204" pitchFamily="34" charset="0"/>
-              <a:buChar char="•"/>
-            </a:pPr>
-            <a:r>
-              <a:rPr lang="en-US" altLang="zh-CN"/>
-              <a:t>Software are not exploited</a:t>
+              <a:t>Software will not be exploited</a:t>
             </a:r>
             <a:endParaRPr lang="en-US" altLang="zh-CN"/>
           </a:p>
@@ -7891,7 +7872,7 @@
         </p:nvSpPr>
         <p:spPr>
           <a:xfrm>
-            <a:off x="4761865" y="4338955"/>
+            <a:off x="4531995" y="4360545"/>
             <a:ext cx="317500" cy="1821815"/>
           </a:xfrm>
           <a:prstGeom prst="leftBrace">
@@ -7931,8 +7912,8 @@
         </p:nvSpPr>
         <p:spPr>
           <a:xfrm>
-            <a:off x="5243830" y="4448175"/>
-            <a:ext cx="3314700" cy="1476375"/>
+            <a:off x="5013960" y="4469765"/>
+            <a:ext cx="3314700" cy="1753235"/>
           </a:xfrm>
           <a:prstGeom prst="rect">
             <a:avLst/>
@@ -7944,13 +7925,13 @@
             <a:spAutoFit/>
           </a:bodyPr>
           <a:p>
-            <a:pPr indent="0">
+            <a:pPr marL="285750" indent="-285750">
               <a:buFont typeface="Arial" panose="020B0604020202020204" pitchFamily="34" charset="0"/>
-              <a:buNone/>
+              <a:buChar char="•"/>
             </a:pPr>
             <a:r>
               <a:rPr lang="en-US" altLang="zh-CN"/>
-              <a:t>Additional examination on bypassed clients. </a:t>
+              <a:t>Additional examination on bypassed nodes. </a:t>
             </a:r>
             <a:endParaRPr lang="en-US" altLang="zh-CN"/>
           </a:p>
@@ -7962,9 +7943,9 @@
             <a:endParaRPr lang="en-US" altLang="zh-CN"/>
           </a:p>
           <a:p>
-            <a:pPr indent="0">
+            <a:pPr marL="285750" indent="-285750">
               <a:buFont typeface="Arial" panose="020B0604020202020204" pitchFamily="34" charset="0"/>
-              <a:buNone/>
+              <a:buChar char="•"/>
             </a:pPr>
             <a:r>
               <a:rPr lang="en-US" altLang="zh-CN"/>
@@ -7990,7 +7971,7 @@
         </p:blipFill>
         <p:spPr>
           <a:xfrm>
-            <a:off x="3517900" y="678815"/>
+            <a:off x="3487420" y="934085"/>
             <a:ext cx="7639050" cy="5248275"/>
           </a:xfrm>
           <a:prstGeom prst="rect">
@@ -8022,7 +8003,7 @@
             <a:pPr algn="ctr"/>
             <a:r>
               <a:rPr lang="en-US" altLang="zh-CN"/>
-              <a:t>HRP system design in [3]</a:t>
+              <a:t>Previous HRP system design in [3]</a:t>
             </a:r>
             <a:endParaRPr lang="en-US" altLang="zh-CN"/>
           </a:p>
@@ -8061,6 +8042,46 @@
           </a:fontRef>
         </p:style>
       </p:cxnSp>
+      <p:sp>
+        <p:nvSpPr>
+          <p:cNvPr id="16" name="左大括号 15"/>
+          <p:cNvSpPr/>
+          <p:nvPr/>
+        </p:nvSpPr>
+        <p:spPr>
+          <a:xfrm>
+            <a:off x="4531995" y="1070610"/>
+            <a:ext cx="396875" cy="825500"/>
+          </a:xfrm>
+          <a:prstGeom prst="leftBrace">
+            <a:avLst>
+              <a:gd name="adj1" fmla="val 8400"/>
+              <a:gd name="adj2" fmla="val 47000"/>
+            </a:avLst>
+          </a:prstGeom>
+        </p:spPr>
+        <p:style>
+          <a:lnRef idx="1">
+            <a:schemeClr val="accent1"/>
+          </a:lnRef>
+          <a:fillRef idx="0">
+            <a:schemeClr val="accent1"/>
+          </a:fillRef>
+          <a:effectRef idx="0">
+            <a:schemeClr val="accent1"/>
+          </a:effectRef>
+          <a:fontRef idx="minor">
+            <a:schemeClr val="tx1"/>
+          </a:fontRef>
+        </p:style>
+        <p:txBody>
+          <a:bodyPr rtlCol="0" anchor="ctr"/>
+          <a:p>
+            <a:pPr algn="ctr"/>
+            <a:endParaRPr lang="zh-CN" altLang="en-US"/>
+          </a:p>
+        </p:txBody>
+      </p:sp>
     </p:spTree>
     <p:custDataLst>
       <p:tags r:id="rId2"/>
@@ -8279,7 +8300,7 @@
                                           </p:stCondLst>
                                         </p:cTn>
                                         <p:tgtEl>
-                                          <p:spTgt spid="9"/>
+                                          <p:spTgt spid="10"/>
                                         </p:tgtEl>
                                         <p:attrNameLst>
                                           <p:attrName>style.visibility</p:attrName>
@@ -8293,7 +8314,7 @@
                                       <p:cBhvr>
                                         <p:cTn id="23" dur="500"/>
                                         <p:tgtEl>
-                                          <p:spTgt spid="9"/>
+                                          <p:spTgt spid="10"/>
                                         </p:tgtEl>
                                       </p:cBhvr>
                                     </p:animEffect>
@@ -8314,7 +8335,7 @@
                                           </p:stCondLst>
                                         </p:cTn>
                                         <p:tgtEl>
-                                          <p:spTgt spid="10"/>
+                                          <p:spTgt spid="7"/>
                                         </p:tgtEl>
                                         <p:attrNameLst>
                                           <p:attrName>style.visibility</p:attrName>
@@ -8328,7 +8349,7 @@
                                       <p:cBhvr>
                                         <p:cTn id="26" dur="500"/>
                                         <p:tgtEl>
-                                          <p:spTgt spid="10"/>
+                                          <p:spTgt spid="7"/>
                                         </p:tgtEl>
                                       </p:cBhvr>
                                     </p:animEffect>
@@ -8336,7 +8357,7 @@
                                 </p:cTn>
                               </p:par>
                               <p:par>
-                                <p:cTn id="27" presetID="22" presetClass="entr" presetSubtype="4" fill="hold" grpId="0" nodeType="withEffect">
+                                <p:cTn id="27" presetID="22" presetClass="entr" presetSubtype="4" fill="hold" grpId="1" nodeType="withEffect">
                                   <p:stCondLst>
                                     <p:cond delay="0"/>
                                   </p:stCondLst>
@@ -8349,7 +8370,7 @@
                                           </p:stCondLst>
                                         </p:cTn>
                                         <p:tgtEl>
-                                          <p:spTgt spid="7"/>
+                                          <p:spTgt spid="10"/>
                                         </p:tgtEl>
                                         <p:attrNameLst>
                                           <p:attrName>style.visibility</p:attrName>
@@ -8363,7 +8384,7 @@
                                       <p:cBhvr>
                                         <p:cTn id="29" dur="500"/>
                                         <p:tgtEl>
-                                          <p:spTgt spid="7"/>
+                                          <p:spTgt spid="10"/>
                                         </p:tgtEl>
                                       </p:cBhvr>
                                     </p:animEffect>
@@ -8528,6 +8549,41 @@
                                   </p:childTnLst>
                                 </p:cTn>
                               </p:par>
+                              <p:par>
+                                <p:cTn id="44" presetID="3" presetClass="entr" presetSubtype="10" fill="hold" grpId="0" nodeType="withEffect">
+                                  <p:stCondLst>
+                                    <p:cond delay="0"/>
+                                  </p:stCondLst>
+                                  <p:childTnLst>
+                                    <p:set>
+                                      <p:cBhvr>
+                                        <p:cTn id="45" dur="1" fill="hold">
+                                          <p:stCondLst>
+                                            <p:cond delay="0"/>
+                                          </p:stCondLst>
+                                        </p:cTn>
+                                        <p:tgtEl>
+                                          <p:spTgt spid="16"/>
+                                        </p:tgtEl>
+                                        <p:attrNameLst>
+                                          <p:attrName>style.visibility</p:attrName>
+                                        </p:attrNameLst>
+                                      </p:cBhvr>
+                                      <p:to>
+                                        <p:strVal val="visible"/>
+                                      </p:to>
+                                    </p:set>
+                                    <p:animEffect transition="in" filter="blinds(horizontal)">
+                                      <p:cBhvr>
+                                        <p:cTn id="46" dur="500"/>
+                                        <p:tgtEl>
+                                          <p:spTgt spid="16"/>
+                                        </p:tgtEl>
+                                      </p:cBhvr>
+                                    </p:animEffect>
+                                  </p:childTnLst>
+                                </p:cTn>
+                              </p:par>
                             </p:childTnLst>
                           </p:cTn>
                         </p:par>
@@ -8556,14 +8612,15 @@
       </p:par>
     </p:tnLst>
     <p:bldLst>
-      <p:bldP spid="9" grpId="0" animBg="1"/>
       <p:bldP spid="10" grpId="0"/>
       <p:bldP spid="7" grpId="0"/>
       <p:bldP spid="8" grpId="0"/>
-      <p:bldP spid="11" grpId="0" animBg="1"/>
+      <p:bldP spid="11" grpId="0" bldLvl="0" animBg="1"/>
       <p:bldP spid="12" grpId="0"/>
       <p:bldP spid="3" grpId="0"/>
       <p:bldP spid="3" grpId="1"/>
+      <p:bldP spid="16" grpId="0" bldLvl="0" animBg="1"/>
+      <p:bldP spid="10" grpId="1"/>
     </p:bldLst>
   </p:timing>
 </p:sld>
@@ -10549,7 +10606,7 @@
         <p:spPr>
           <a:xfrm>
             <a:off x="451485" y="967105"/>
-            <a:ext cx="5080635" cy="2584450"/>
+            <a:ext cx="5080635" cy="5077460"/>
           </a:xfrm>
           <a:prstGeom prst="rect">
             <a:avLst/>
@@ -10570,7 +10627,7 @@
           <a:p>
             <a:r>
               <a:rPr lang="en-US" altLang="zh-CN"/>
-              <a:t>attacker with some malicious devices and emulators bypassing client side detection. </a:t>
+              <a:t>Attacker with some malicious devices and Sybils bypassing client side detection. </a:t>
             </a:r>
             <a:endParaRPr lang="en-US" altLang="zh-CN"/>
           </a:p>
@@ -10593,12 +10650,225 @@
               <a:t>Our goal is to detect these evil virtual deivices with WiFi signals.</a:t>
             </a:r>
             <a:endParaRPr lang="en-US" altLang="zh-CN"/>
+          </a:p>
+          <a:p>
+            <a:endParaRPr lang="en-US" altLang="zh-CN"/>
+          </a:p>
+          <a:p>
+            <a:r>
+              <a:rPr lang="en-US" altLang="zh-CN"/>
+              <a:t>Nodes would get scores based on their physical presence condition, elimination of Sybil nodes will be based on these scores.</a:t>
+            </a:r>
+            <a:endParaRPr lang="en-US" altLang="zh-CN"/>
+          </a:p>
+          <a:p>
+            <a:endParaRPr lang="en-US" altLang="zh-CN">
+              <a:solidFill>
+                <a:srgbClr val="FF0000"/>
+              </a:solidFill>
+            </a:endParaRPr>
+          </a:p>
+          <a:p>
+            <a:r>
+              <a:rPr lang="en-US" altLang="zh-CN">
+                <a:solidFill>
+                  <a:srgbClr val="FF0000"/>
+                </a:solidFill>
+              </a:rPr>
+              <a:t>Threats</a:t>
+            </a:r>
+            <a:endParaRPr lang="en-US" altLang="zh-CN">
+              <a:solidFill>
+                <a:srgbClr val="FF0000"/>
+              </a:solidFill>
+            </a:endParaRPr>
+          </a:p>
+          <a:p>
+            <a:r>
+              <a:rPr lang="en-US" altLang="zh-CN">
+                <a:solidFill>
+                  <a:schemeClr val="tx1"/>
+                </a:solidFill>
+              </a:rPr>
+              <a:t>Attacker would try to evade his evil devices as well as framing legitimate devices -&gt; evil devices stay, legitimate devices get eliminated</a:t>
+            </a:r>
+            <a:endParaRPr lang="en-US" altLang="zh-CN">
+              <a:solidFill>
+                <a:schemeClr val="tx1"/>
+              </a:solidFill>
+            </a:endParaRPr>
+          </a:p>
+        </p:txBody>
+      </p:sp>
+      <p:sp>
+        <p:nvSpPr>
+          <p:cNvPr id="17" name="文本框 16"/>
+          <p:cNvSpPr txBox="1"/>
+          <p:nvPr/>
+        </p:nvSpPr>
+        <p:spPr>
+          <a:xfrm>
+            <a:off x="439420" y="1309370"/>
+            <a:ext cx="4807585" cy="2306955"/>
+          </a:xfrm>
+          <a:prstGeom prst="rect">
+            <a:avLst/>
+          </a:prstGeom>
+          <a:noFill/>
+        </p:spPr>
+        <p:txBody>
+          <a:bodyPr wrap="square" rtlCol="0">
+            <a:spAutoFit/>
+          </a:bodyPr>
+          <a:p>
+            <a:r>
+              <a:rPr lang="en-US" altLang="zh-CN" b="1">
+                <a:solidFill>
+                  <a:srgbClr val="FF0000"/>
+                </a:solidFill>
+              </a:rPr>
+              <a:t>Old Threat model:</a:t>
+            </a:r>
+            <a:r>
+              <a:rPr lang="en-US" altLang="zh-CN"/>
+              <a:t> Sybil nodes need to rely on other nodes to broadcast.</a:t>
+            </a:r>
+            <a:endParaRPr lang="en-US" altLang="zh-CN"/>
+          </a:p>
+          <a:p>
+            <a:endParaRPr lang="en-US" altLang="zh-CN"/>
+          </a:p>
+          <a:p>
+            <a:r>
+              <a:rPr lang="en-US" altLang="zh-CN" b="1">
+                <a:solidFill>
+                  <a:srgbClr val="FF0000"/>
+                </a:solidFill>
+              </a:rPr>
+              <a:t>Too strict</a:t>
+            </a:r>
+            <a:r>
+              <a:rPr lang="en-US" altLang="zh-CN"/>
+              <a:t>. In fact, attackers can use any other devices to broadcast signals on Sybil nodes behalf.</a:t>
+            </a:r>
+            <a:endParaRPr lang="en-US" altLang="zh-CN"/>
+          </a:p>
+          <a:p>
+            <a:endParaRPr lang="en-US" altLang="zh-CN"/>
+          </a:p>
+          <a:p>
+            <a:endParaRPr lang="en-US" altLang="zh-CN"/>
+          </a:p>
+        </p:txBody>
+      </p:sp>
+      <p:pic>
+        <p:nvPicPr>
+          <p:cNvPr id="18" name="图片 17" descr="AttackModel"/>
+          <p:cNvPicPr>
+            <a:picLocks noChangeAspect="1"/>
+          </p:cNvPicPr>
+          <p:nvPr/>
+        </p:nvPicPr>
+        <p:blipFill>
+          <a:blip r:embed="rId2"/>
+          <a:stretch>
+            <a:fillRect/>
+          </a:stretch>
+        </p:blipFill>
+        <p:spPr>
+          <a:xfrm>
+            <a:off x="6700520" y="1309370"/>
+            <a:ext cx="3827145" cy="3661410"/>
+          </a:xfrm>
+          <a:prstGeom prst="rect">
+            <a:avLst/>
+          </a:prstGeom>
+        </p:spPr>
+      </p:pic>
+      <p:sp>
+        <p:nvSpPr>
+          <p:cNvPr id="19" name="文本框 18"/>
+          <p:cNvSpPr txBox="1"/>
+          <p:nvPr/>
+        </p:nvSpPr>
+        <p:spPr>
+          <a:xfrm>
+            <a:off x="6745605" y="5146675"/>
+            <a:ext cx="4323080" cy="368300"/>
+          </a:xfrm>
+          <a:prstGeom prst="rect">
+            <a:avLst/>
+          </a:prstGeom>
+          <a:noFill/>
+        </p:spPr>
+        <p:txBody>
+          <a:bodyPr wrap="square" rtlCol="0">
+            <a:spAutoFit/>
+          </a:bodyPr>
+          <a:p>
+            <a:r>
+              <a:rPr lang="en-US" altLang="zh-CN"/>
+              <a:t>Figure 6. Laptop help broadcast signals</a:t>
+            </a:r>
+            <a:endParaRPr lang="en-US" altLang="zh-CN"/>
+          </a:p>
+        </p:txBody>
+      </p:sp>
+      <p:sp>
+        <p:nvSpPr>
+          <p:cNvPr id="20" name="文本框 19"/>
+          <p:cNvSpPr txBox="1"/>
+          <p:nvPr/>
+        </p:nvSpPr>
+        <p:spPr>
+          <a:xfrm>
+            <a:off x="439420" y="4220210"/>
+            <a:ext cx="5077460" cy="1198880"/>
+          </a:xfrm>
+          <a:prstGeom prst="rect">
+            <a:avLst/>
+          </a:prstGeom>
+          <a:noFill/>
+        </p:spPr>
+        <p:txBody>
+          <a:bodyPr wrap="square" rtlCol="0">
+            <a:spAutoFit/>
+          </a:bodyPr>
+          <a:p>
+            <a:r>
+              <a:rPr lang="en-US" altLang="zh-CN" b="1">
+                <a:solidFill>
+                  <a:srgbClr val="FF0000"/>
+                </a:solidFill>
+              </a:rPr>
+              <a:t>New Threat model: </a:t>
+            </a:r>
+            <a:r>
+              <a:rPr lang="en-US" altLang="zh-CN">
+                <a:solidFill>
+                  <a:schemeClr val="tx1"/>
+                </a:solidFill>
+              </a:rPr>
+              <a:t>Attacker can use a laptop(more powerful CPU) to broadcast signals on Sybil nodes behalf.</a:t>
+            </a:r>
+            <a:endParaRPr lang="en-US" altLang="zh-CN">
+              <a:solidFill>
+                <a:schemeClr val="tx1"/>
+              </a:solidFill>
+            </a:endParaRPr>
+          </a:p>
+          <a:p>
+            <a:endParaRPr lang="en-US" altLang="zh-CN">
+              <a:solidFill>
+                <a:schemeClr val="tx1"/>
+              </a:solidFill>
+            </a:endParaRPr>
           </a:p>
         </p:txBody>
       </p:sp>
     </p:spTree>
     <p:custDataLst>
-      <p:tags r:id="rId2"/>
+      <p:tags r:id="rId3"/>
     </p:custDataLst>
   </p:cSld>
   <p:clrMapOvr>
@@ -10712,15 +10982,349 @@
                                   </p:childTnLst>
                                 </p:cTn>
                               </p:par>
+                            </p:childTnLst>
+                          </p:cTn>
+                        </p:par>
+                      </p:childTnLst>
+                    </p:cTn>
+                  </p:par>
+                  <p:par>
+                    <p:cTn id="13" fill="hold">
+                      <p:stCondLst>
+                        <p:cond delay="indefinite"/>
+                      </p:stCondLst>
+                      <p:childTnLst>
+                        <p:par>
+                          <p:cTn id="14" fill="hold">
+                            <p:stCondLst>
+                              <p:cond delay="0"/>
+                            </p:stCondLst>
+                            <p:childTnLst>
                               <p:par>
-                                <p:cTn id="13" presetID="22" presetClass="entr" presetSubtype="4" fill="hold" nodeType="withEffect">
+                                <p:cTn id="15" presetID="22" presetClass="entr" presetSubtype="4" fill="hold" grpId="1" nodeType="clickEffect">
                                   <p:stCondLst>
                                     <p:cond delay="0"/>
                                   </p:stCondLst>
                                   <p:childTnLst>
                                     <p:set>
                                       <p:cBhvr>
-                                        <p:cTn id="14" dur="1" fill="hold">
+                                        <p:cTn id="16" dur="1" fill="hold">
+                                          <p:stCondLst>
+                                            <p:cond delay="0"/>
+                                          </p:stCondLst>
+                                        </p:cTn>
+                                        <p:tgtEl>
+                                          <p:spTgt spid="17"/>
+                                        </p:tgtEl>
+                                        <p:attrNameLst>
+                                          <p:attrName>style.visibility</p:attrName>
+                                        </p:attrNameLst>
+                                      </p:cBhvr>
+                                      <p:to>
+                                        <p:strVal val="visible"/>
+                                      </p:to>
+                                    </p:set>
+                                    <p:animEffect transition="in" filter="wipe(down)">
+                                      <p:cBhvr>
+                                        <p:cTn id="17" dur="500"/>
+                                        <p:tgtEl>
+                                          <p:spTgt spid="17"/>
+                                        </p:tgtEl>
+                                      </p:cBhvr>
+                                    </p:animEffect>
+                                  </p:childTnLst>
+                                </p:cTn>
+                              </p:par>
+                              <p:par>
+                                <p:cTn id="18" presetID="22" presetClass="entr" presetSubtype="4" fill="hold" nodeType="withEffect">
+                                  <p:stCondLst>
+                                    <p:cond delay="0"/>
+                                  </p:stCondLst>
+                                  <p:childTnLst>
+                                    <p:set>
+                                      <p:cBhvr>
+                                        <p:cTn id="19" dur="1" fill="hold">
+                                          <p:stCondLst>
+                                            <p:cond delay="0"/>
+                                          </p:stCondLst>
+                                        </p:cTn>
+                                        <p:tgtEl>
+                                          <p:spTgt spid="18"/>
+                                        </p:tgtEl>
+                                        <p:attrNameLst>
+                                          <p:attrName>style.visibility</p:attrName>
+                                        </p:attrNameLst>
+                                      </p:cBhvr>
+                                      <p:to>
+                                        <p:strVal val="visible"/>
+                                      </p:to>
+                                    </p:set>
+                                    <p:animEffect transition="in" filter="wipe(down)">
+                                      <p:cBhvr>
+                                        <p:cTn id="20" dur="500"/>
+                                        <p:tgtEl>
+                                          <p:spTgt spid="18"/>
+                                        </p:tgtEl>
+                                      </p:cBhvr>
+                                    </p:animEffect>
+                                  </p:childTnLst>
+                                </p:cTn>
+                              </p:par>
+                              <p:par>
+                                <p:cTn id="21" presetID="22" presetClass="entr" presetSubtype="4" fill="hold" grpId="1" nodeType="withEffect">
+                                  <p:stCondLst>
+                                    <p:cond delay="0"/>
+                                  </p:stCondLst>
+                                  <p:childTnLst>
+                                    <p:set>
+                                      <p:cBhvr>
+                                        <p:cTn id="22" dur="1" fill="hold">
+                                          <p:stCondLst>
+                                            <p:cond delay="0"/>
+                                          </p:stCondLst>
+                                        </p:cTn>
+                                        <p:tgtEl>
+                                          <p:spTgt spid="19"/>
+                                        </p:tgtEl>
+                                        <p:attrNameLst>
+                                          <p:attrName>style.visibility</p:attrName>
+                                        </p:attrNameLst>
+                                      </p:cBhvr>
+                                      <p:to>
+                                        <p:strVal val="visible"/>
+                                      </p:to>
+                                    </p:set>
+                                    <p:animEffect transition="in" filter="wipe(down)">
+                                      <p:cBhvr>
+                                        <p:cTn id="23" dur="500"/>
+                                        <p:tgtEl>
+                                          <p:spTgt spid="19"/>
+                                        </p:tgtEl>
+                                      </p:cBhvr>
+                                    </p:animEffect>
+                                  </p:childTnLst>
+                                </p:cTn>
+                              </p:par>
+                              <p:par>
+                                <p:cTn id="24" presetID="22" presetClass="entr" presetSubtype="4" fill="hold" grpId="1" nodeType="withEffect">
+                                  <p:stCondLst>
+                                    <p:cond delay="0"/>
+                                  </p:stCondLst>
+                                  <p:childTnLst>
+                                    <p:set>
+                                      <p:cBhvr>
+                                        <p:cTn id="25" dur="1" fill="hold">
+                                          <p:stCondLst>
+                                            <p:cond delay="0"/>
+                                          </p:stCondLst>
+                                        </p:cTn>
+                                        <p:tgtEl>
+                                          <p:spTgt spid="20"/>
+                                        </p:tgtEl>
+                                        <p:attrNameLst>
+                                          <p:attrName>style.visibility</p:attrName>
+                                        </p:attrNameLst>
+                                      </p:cBhvr>
+                                      <p:to>
+                                        <p:strVal val="visible"/>
+                                      </p:to>
+                                    </p:set>
+                                    <p:animEffect transition="in" filter="wipe(down)">
+                                      <p:cBhvr>
+                                        <p:cTn id="26" dur="500"/>
+                                        <p:tgtEl>
+                                          <p:spTgt spid="20"/>
+                                        </p:tgtEl>
+                                      </p:cBhvr>
+                                    </p:animEffect>
+                                  </p:childTnLst>
+                                </p:cTn>
+                              </p:par>
+                            </p:childTnLst>
+                          </p:cTn>
+                        </p:par>
+                      </p:childTnLst>
+                    </p:cTn>
+                  </p:par>
+                  <p:par>
+                    <p:cTn id="27" fill="hold">
+                      <p:stCondLst>
+                        <p:cond delay="indefinite"/>
+                      </p:stCondLst>
+                      <p:childTnLst>
+                        <p:par>
+                          <p:cTn id="28" fill="hold">
+                            <p:stCondLst>
+                              <p:cond delay="0"/>
+                            </p:stCondLst>
+                            <p:childTnLst>
+                              <p:par>
+                                <p:cTn id="29" presetID="22" presetClass="exit" presetSubtype="4" fill="hold" nodeType="clickEffect">
+                                  <p:stCondLst>
+                                    <p:cond delay="0"/>
+                                  </p:stCondLst>
+                                  <p:childTnLst>
+                                    <p:animEffect transition="out" filter="wipe(down)">
+                                      <p:cBhvr>
+                                        <p:cTn id="30" dur="500"/>
+                                        <p:tgtEl>
+                                          <p:spTgt spid="18"/>
+                                        </p:tgtEl>
+                                      </p:cBhvr>
+                                    </p:animEffect>
+                                    <p:set>
+                                      <p:cBhvr>
+                                        <p:cTn id="31" dur="1" fill="hold">
+                                          <p:stCondLst>
+                                            <p:cond delay="499"/>
+                                          </p:stCondLst>
+                                        </p:cTn>
+                                        <p:tgtEl>
+                                          <p:spTgt spid="18"/>
+                                        </p:tgtEl>
+                                        <p:attrNameLst>
+                                          <p:attrName>style.visibility</p:attrName>
+                                        </p:attrNameLst>
+                                      </p:cBhvr>
+                                      <p:to>
+                                        <p:strVal val="hidden"/>
+                                      </p:to>
+                                    </p:set>
+                                  </p:childTnLst>
+                                </p:cTn>
+                              </p:par>
+                              <p:par>
+                                <p:cTn id="32" presetID="22" presetClass="exit" presetSubtype="4" fill="hold" grpId="2" nodeType="withEffect">
+                                  <p:stCondLst>
+                                    <p:cond delay="0"/>
+                                  </p:stCondLst>
+                                  <p:childTnLst>
+                                    <p:animEffect transition="out" filter="wipe(down)">
+                                      <p:cBhvr>
+                                        <p:cTn id="33" dur="500"/>
+                                        <p:tgtEl>
+                                          <p:spTgt spid="17"/>
+                                        </p:tgtEl>
+                                      </p:cBhvr>
+                                    </p:animEffect>
+                                    <p:set>
+                                      <p:cBhvr>
+                                        <p:cTn id="34" dur="1" fill="hold">
+                                          <p:stCondLst>
+                                            <p:cond delay="499"/>
+                                          </p:stCondLst>
+                                        </p:cTn>
+                                        <p:tgtEl>
+                                          <p:spTgt spid="17"/>
+                                        </p:tgtEl>
+                                        <p:attrNameLst>
+                                          <p:attrName>style.visibility</p:attrName>
+                                        </p:attrNameLst>
+                                      </p:cBhvr>
+                                      <p:to>
+                                        <p:strVal val="hidden"/>
+                                      </p:to>
+                                    </p:set>
+                                  </p:childTnLst>
+                                </p:cTn>
+                              </p:par>
+                              <p:par>
+                                <p:cTn id="35" presetID="22" presetClass="exit" presetSubtype="4" fill="hold" grpId="2" nodeType="withEffect">
+                                  <p:stCondLst>
+                                    <p:cond delay="0"/>
+                                  </p:stCondLst>
+                                  <p:childTnLst>
+                                    <p:animEffect transition="out" filter="wipe(down)">
+                                      <p:cBhvr>
+                                        <p:cTn id="36" dur="500"/>
+                                        <p:tgtEl>
+                                          <p:spTgt spid="20"/>
+                                        </p:tgtEl>
+                                      </p:cBhvr>
+                                    </p:animEffect>
+                                    <p:set>
+                                      <p:cBhvr>
+                                        <p:cTn id="37" dur="1" fill="hold">
+                                          <p:stCondLst>
+                                            <p:cond delay="499"/>
+                                          </p:stCondLst>
+                                        </p:cTn>
+                                        <p:tgtEl>
+                                          <p:spTgt spid="20"/>
+                                        </p:tgtEl>
+                                        <p:attrNameLst>
+                                          <p:attrName>style.visibility</p:attrName>
+                                        </p:attrNameLst>
+                                      </p:cBhvr>
+                                      <p:to>
+                                        <p:strVal val="hidden"/>
+                                      </p:to>
+                                    </p:set>
+                                  </p:childTnLst>
+                                </p:cTn>
+                              </p:par>
+                              <p:par>
+                                <p:cTn id="38" presetID="22" presetClass="exit" presetSubtype="4" fill="hold" grpId="2" nodeType="withEffect">
+                                  <p:stCondLst>
+                                    <p:cond delay="0"/>
+                                  </p:stCondLst>
+                                  <p:childTnLst>
+                                    <p:animEffect transition="out" filter="wipe(down)">
+                                      <p:cBhvr>
+                                        <p:cTn id="39" dur="500"/>
+                                        <p:tgtEl>
+                                          <p:spTgt spid="19"/>
+                                        </p:tgtEl>
+                                      </p:cBhvr>
+                                    </p:animEffect>
+                                    <p:set>
+                                      <p:cBhvr>
+                                        <p:cTn id="40" dur="1" fill="hold">
+                                          <p:stCondLst>
+                                            <p:cond delay="499"/>
+                                          </p:stCondLst>
+                                        </p:cTn>
+                                        <p:tgtEl>
+                                          <p:spTgt spid="19"/>
+                                        </p:tgtEl>
+                                        <p:attrNameLst>
+                                          <p:attrName>style.visibility</p:attrName>
+                                        </p:attrNameLst>
+                                      </p:cBhvr>
+                                      <p:to>
+                                        <p:strVal val="hidden"/>
+                                      </p:to>
+                                    </p:set>
+                                  </p:childTnLst>
+                                </p:cTn>
+                              </p:par>
+                            </p:childTnLst>
+                          </p:cTn>
+                        </p:par>
+                      </p:childTnLst>
+                    </p:cTn>
+                  </p:par>
+                  <p:par>
+                    <p:cTn id="41" fill="hold">
+                      <p:stCondLst>
+                        <p:cond delay="indefinite"/>
+                      </p:stCondLst>
+                      <p:childTnLst>
+                        <p:par>
+                          <p:cTn id="42" fill="hold">
+                            <p:stCondLst>
+                              <p:cond delay="0"/>
+                            </p:stCondLst>
+                            <p:childTnLst>
+                              <p:par>
+                                <p:cTn id="43" presetID="22" presetClass="entr" presetSubtype="4" fill="hold" nodeType="clickEffect">
+                                  <p:stCondLst>
+                                    <p:cond delay="0"/>
+                                  </p:stCondLst>
+                                  <p:childTnLst>
+                                    <p:set>
+                                      <p:cBhvr>
+                                        <p:cTn id="44" dur="1" fill="hold">
                                           <p:stCondLst>
                                             <p:cond delay="0"/>
                                           </p:stCondLst>
@@ -10738,7 +11342,7 @@
                                     </p:set>
                                     <p:animEffect transition="in" filter="wipe(down)">
                                       <p:cBhvr>
-                                        <p:cTn id="15" dur="500"/>
+                                        <p:cTn id="45" dur="500"/>
                                         <p:tgtEl>
                                           <p:spTgt spid="5"/>
                                         </p:tgtEl>
@@ -10748,14 +11352,14 @@
                                 </p:cTn>
                               </p:par>
                               <p:par>
-                                <p:cTn id="16" presetID="22" presetClass="entr" presetSubtype="4" fill="hold" grpId="0" nodeType="withEffect">
+                                <p:cTn id="46" presetID="22" presetClass="entr" presetSubtype="4" fill="hold" grpId="0" nodeType="withEffect">
                                   <p:stCondLst>
                                     <p:cond delay="0"/>
                                   </p:stCondLst>
                                   <p:childTnLst>
                                     <p:set>
                                       <p:cBhvr>
-                                        <p:cTn id="17" dur="1" fill="hold">
+                                        <p:cTn id="47" dur="1" fill="hold">
                                           <p:stCondLst>
                                             <p:cond delay="0"/>
                                           </p:stCondLst>
@@ -10773,9 +11377,359 @@
                                     </p:set>
                                     <p:animEffect transition="in" filter="wipe(down)">
                                       <p:cBhvr>
-                                        <p:cTn id="18" dur="500"/>
+                                        <p:cTn id="48" dur="500"/>
                                         <p:tgtEl>
                                           <p:spTgt spid="6"/>
+                                        </p:tgtEl>
+                                      </p:cBhvr>
+                                    </p:animEffect>
+                                  </p:childTnLst>
+                                </p:cTn>
+                              </p:par>
+                              <p:par>
+                                <p:cTn id="49" presetID="22" presetClass="entr" presetSubtype="4" fill="hold" grpId="1" nodeType="withEffect">
+                                  <p:stCondLst>
+                                    <p:cond delay="0"/>
+                                  </p:stCondLst>
+                                  <p:childTnLst>
+                                    <p:set>
+                                      <p:cBhvr>
+                                        <p:cTn id="50" dur="1" fill="hold">
+                                          <p:stCondLst>
+                                            <p:cond delay="0"/>
+                                          </p:stCondLst>
+                                        </p:cTn>
+                                        <p:tgtEl>
+                                          <p:spTgt spid="7"/>
+                                        </p:tgtEl>
+                                        <p:attrNameLst>
+                                          <p:attrName>style.visibility</p:attrName>
+                                        </p:attrNameLst>
+                                      </p:cBhvr>
+                                      <p:to>
+                                        <p:strVal val="visible"/>
+                                      </p:to>
+                                    </p:set>
+                                    <p:animEffect transition="in" filter="wipe(down)">
+                                      <p:cBhvr>
+                                        <p:cTn id="51" dur="500"/>
+                                        <p:tgtEl>
+                                          <p:spTgt spid="7"/>
+                                        </p:tgtEl>
+                                      </p:cBhvr>
+                                    </p:animEffect>
+                                  </p:childTnLst>
+                                </p:cTn>
+                              </p:par>
+                              <p:par>
+                                <p:cTn id="52" presetID="22" presetClass="entr" presetSubtype="4" fill="hold" grpId="0" nodeType="withEffect">
+                                  <p:stCondLst>
+                                    <p:cond delay="0"/>
+                                  </p:stCondLst>
+                                  <p:childTnLst>
+                                    <p:set>
+                                      <p:cBhvr>
+                                        <p:cTn id="53" dur="1" fill="hold">
+                                          <p:stCondLst>
+                                            <p:cond delay="0"/>
+                                          </p:stCondLst>
+                                        </p:cTn>
+                                        <p:tgtEl>
+                                          <p:spTgt spid="8"/>
+                                        </p:tgtEl>
+                                        <p:attrNameLst>
+                                          <p:attrName>style.visibility</p:attrName>
+                                        </p:attrNameLst>
+                                      </p:cBhvr>
+                                      <p:to>
+                                        <p:strVal val="visible"/>
+                                      </p:to>
+                                    </p:set>
+                                    <p:animEffect transition="in" filter="wipe(down)">
+                                      <p:cBhvr>
+                                        <p:cTn id="54" dur="500"/>
+                                        <p:tgtEl>
+                                          <p:spTgt spid="8"/>
+                                        </p:tgtEl>
+                                      </p:cBhvr>
+                                    </p:animEffect>
+                                  </p:childTnLst>
+                                </p:cTn>
+                              </p:par>
+                              <p:par>
+                                <p:cTn id="55" presetID="22" presetClass="entr" presetSubtype="4" fill="hold" grpId="0" nodeType="withEffect">
+                                  <p:stCondLst>
+                                    <p:cond delay="0"/>
+                                  </p:stCondLst>
+                                  <p:childTnLst>
+                                    <p:set>
+                                      <p:cBhvr>
+                                        <p:cTn id="56" dur="1" fill="hold">
+                                          <p:stCondLst>
+                                            <p:cond delay="0"/>
+                                          </p:stCondLst>
+                                        </p:cTn>
+                                        <p:tgtEl>
+                                          <p:spTgt spid="9"/>
+                                        </p:tgtEl>
+                                        <p:attrNameLst>
+                                          <p:attrName>style.visibility</p:attrName>
+                                        </p:attrNameLst>
+                                      </p:cBhvr>
+                                      <p:to>
+                                        <p:strVal val="visible"/>
+                                      </p:to>
+                                    </p:set>
+                                    <p:animEffect transition="in" filter="wipe(down)">
+                                      <p:cBhvr>
+                                        <p:cTn id="57" dur="500"/>
+                                        <p:tgtEl>
+                                          <p:spTgt spid="9"/>
+                                        </p:tgtEl>
+                                      </p:cBhvr>
+                                    </p:animEffect>
+                                  </p:childTnLst>
+                                </p:cTn>
+                              </p:par>
+                              <p:par>
+                                <p:cTn id="58" presetID="22" presetClass="entr" presetSubtype="4" fill="hold" grpId="0" nodeType="withEffect">
+                                  <p:stCondLst>
+                                    <p:cond delay="0"/>
+                                  </p:stCondLst>
+                                  <p:childTnLst>
+                                    <p:set>
+                                      <p:cBhvr>
+                                        <p:cTn id="59" dur="1" fill="hold">
+                                          <p:stCondLst>
+                                            <p:cond delay="0"/>
+                                          </p:stCondLst>
+                                        </p:cTn>
+                                        <p:tgtEl>
+                                          <p:spTgt spid="10"/>
+                                        </p:tgtEl>
+                                        <p:attrNameLst>
+                                          <p:attrName>style.visibility</p:attrName>
+                                        </p:attrNameLst>
+                                      </p:cBhvr>
+                                      <p:to>
+                                        <p:strVal val="visible"/>
+                                      </p:to>
+                                    </p:set>
+                                    <p:animEffect transition="in" filter="wipe(down)">
+                                      <p:cBhvr>
+                                        <p:cTn id="60" dur="500"/>
+                                        <p:tgtEl>
+                                          <p:spTgt spid="10"/>
+                                        </p:tgtEl>
+                                      </p:cBhvr>
+                                    </p:animEffect>
+                                  </p:childTnLst>
+                                </p:cTn>
+                              </p:par>
+                              <p:par>
+                                <p:cTn id="61" presetID="22" presetClass="entr" presetSubtype="4" fill="hold" grpId="0" nodeType="withEffect">
+                                  <p:stCondLst>
+                                    <p:cond delay="0"/>
+                                  </p:stCondLst>
+                                  <p:childTnLst>
+                                    <p:set>
+                                      <p:cBhvr>
+                                        <p:cTn id="62" dur="1" fill="hold">
+                                          <p:stCondLst>
+                                            <p:cond delay="0"/>
+                                          </p:stCondLst>
+                                        </p:cTn>
+                                        <p:tgtEl>
+                                          <p:spTgt spid="11"/>
+                                        </p:tgtEl>
+                                        <p:attrNameLst>
+                                          <p:attrName>style.visibility</p:attrName>
+                                        </p:attrNameLst>
+                                      </p:cBhvr>
+                                      <p:to>
+                                        <p:strVal val="visible"/>
+                                      </p:to>
+                                    </p:set>
+                                    <p:animEffect transition="in" filter="wipe(down)">
+                                      <p:cBhvr>
+                                        <p:cTn id="63" dur="500"/>
+                                        <p:tgtEl>
+                                          <p:spTgt spid="11"/>
+                                        </p:tgtEl>
+                                      </p:cBhvr>
+                                    </p:animEffect>
+                                  </p:childTnLst>
+                                </p:cTn>
+                              </p:par>
+                              <p:par>
+                                <p:cTn id="64" presetID="22" presetClass="entr" presetSubtype="4" fill="hold" grpId="0" nodeType="withEffect">
+                                  <p:stCondLst>
+                                    <p:cond delay="0"/>
+                                  </p:stCondLst>
+                                  <p:childTnLst>
+                                    <p:set>
+                                      <p:cBhvr>
+                                        <p:cTn id="65" dur="1" fill="hold">
+                                          <p:stCondLst>
+                                            <p:cond delay="0"/>
+                                          </p:stCondLst>
+                                        </p:cTn>
+                                        <p:tgtEl>
+                                          <p:spTgt spid="12"/>
+                                        </p:tgtEl>
+                                        <p:attrNameLst>
+                                          <p:attrName>style.visibility</p:attrName>
+                                        </p:attrNameLst>
+                                      </p:cBhvr>
+                                      <p:to>
+                                        <p:strVal val="visible"/>
+                                      </p:to>
+                                    </p:set>
+                                    <p:animEffect transition="in" filter="wipe(down)">
+                                      <p:cBhvr>
+                                        <p:cTn id="66" dur="500"/>
+                                        <p:tgtEl>
+                                          <p:spTgt spid="12"/>
+                                        </p:tgtEl>
+                                      </p:cBhvr>
+                                    </p:animEffect>
+                                  </p:childTnLst>
+                                </p:cTn>
+                              </p:par>
+                              <p:par>
+                                <p:cTn id="67" presetID="22" presetClass="entr" presetSubtype="4" fill="hold" grpId="0" nodeType="withEffect">
+                                  <p:stCondLst>
+                                    <p:cond delay="0"/>
+                                  </p:stCondLst>
+                                  <p:childTnLst>
+                                    <p:set>
+                                      <p:cBhvr>
+                                        <p:cTn id="68" dur="1" fill="hold">
+                                          <p:stCondLst>
+                                            <p:cond delay="0"/>
+                                          </p:stCondLst>
+                                        </p:cTn>
+                                        <p:tgtEl>
+                                          <p:spTgt spid="13"/>
+                                        </p:tgtEl>
+                                        <p:attrNameLst>
+                                          <p:attrName>style.visibility</p:attrName>
+                                        </p:attrNameLst>
+                                      </p:cBhvr>
+                                      <p:to>
+                                        <p:strVal val="visible"/>
+                                      </p:to>
+                                    </p:set>
+                                    <p:animEffect transition="in" filter="wipe(down)">
+                                      <p:cBhvr>
+                                        <p:cTn id="69" dur="500"/>
+                                        <p:tgtEl>
+                                          <p:spTgt spid="13"/>
+                                        </p:tgtEl>
+                                      </p:cBhvr>
+                                    </p:animEffect>
+                                  </p:childTnLst>
+                                </p:cTn>
+                              </p:par>
+                              <p:par>
+                                <p:cTn id="70" presetID="22" presetClass="entr" presetSubtype="4" fill="hold" grpId="0" nodeType="withEffect">
+                                  <p:stCondLst>
+                                    <p:cond delay="0"/>
+                                  </p:stCondLst>
+                                  <p:childTnLst>
+                                    <p:set>
+                                      <p:cBhvr>
+                                        <p:cTn id="71" dur="1" fill="hold">
+                                          <p:stCondLst>
+                                            <p:cond delay="0"/>
+                                          </p:stCondLst>
+                                        </p:cTn>
+                                        <p:tgtEl>
+                                          <p:spTgt spid="14"/>
+                                        </p:tgtEl>
+                                        <p:attrNameLst>
+                                          <p:attrName>style.visibility</p:attrName>
+                                        </p:attrNameLst>
+                                      </p:cBhvr>
+                                      <p:to>
+                                        <p:strVal val="visible"/>
+                                      </p:to>
+                                    </p:set>
+                                    <p:animEffect transition="in" filter="wipe(down)">
+                                      <p:cBhvr>
+                                        <p:cTn id="72" dur="500"/>
+                                        <p:tgtEl>
+                                          <p:spTgt spid="14"/>
+                                        </p:tgtEl>
+                                      </p:cBhvr>
+                                    </p:animEffect>
+                                  </p:childTnLst>
+                                </p:cTn>
+                              </p:par>
+                              <p:par>
+                                <p:cTn id="73" presetID="22" presetClass="entr" presetSubtype="4" fill="hold" grpId="0" nodeType="withEffect">
+                                  <p:stCondLst>
+                                    <p:cond delay="0"/>
+                                  </p:stCondLst>
+                                  <p:childTnLst>
+                                    <p:set>
+                                      <p:cBhvr>
+                                        <p:cTn id="74" dur="1" fill="hold">
+                                          <p:stCondLst>
+                                            <p:cond delay="0"/>
+                                          </p:stCondLst>
+                                        </p:cTn>
+                                        <p:tgtEl>
+                                          <p:spTgt spid="15"/>
+                                        </p:tgtEl>
+                                        <p:attrNameLst>
+                                          <p:attrName>style.visibility</p:attrName>
+                                        </p:attrNameLst>
+                                      </p:cBhvr>
+                                      <p:to>
+                                        <p:strVal val="visible"/>
+                                      </p:to>
+                                    </p:set>
+                                    <p:animEffect transition="in" filter="wipe(down)">
+                                      <p:cBhvr>
+                                        <p:cTn id="75" dur="500"/>
+                                        <p:tgtEl>
+                                          <p:spTgt spid="15"/>
+                                        </p:tgtEl>
+                                      </p:cBhvr>
+                                    </p:animEffect>
+                                  </p:childTnLst>
+                                </p:cTn>
+                              </p:par>
+                              <p:par>
+                                <p:cTn id="76" presetID="22" presetClass="entr" presetSubtype="4" fill="hold" grpId="0" nodeType="withEffect">
+                                  <p:stCondLst>
+                                    <p:cond delay="0"/>
+                                  </p:stCondLst>
+                                  <p:childTnLst>
+                                    <p:set>
+                                      <p:cBhvr>
+                                        <p:cTn id="77" dur="1" fill="hold">
+                                          <p:stCondLst>
+                                            <p:cond delay="0"/>
+                                          </p:stCondLst>
+                                        </p:cTn>
+                                        <p:tgtEl>
+                                          <p:spTgt spid="16"/>
+                                        </p:tgtEl>
+                                        <p:attrNameLst>
+                                          <p:attrName>style.visibility</p:attrName>
+                                        </p:attrNameLst>
+                                      </p:cBhvr>
+                                      <p:to>
+                                        <p:strVal val="visible"/>
+                                      </p:to>
+                                    </p:set>
+                                    <p:animEffect transition="in" filter="wipe(down)">
+                                      <p:cBhvr>
+                                        <p:cTn id="78" dur="500"/>
+                                        <p:tgtEl>
+                                          <p:spTgt spid="16"/>
                                         </p:tgtEl>
                                       </p:cBhvr>
                                     </p:animEffect>
@@ -10813,228 +11767,28 @@
       <p:bldP spid="6" grpId="0"/>
       <p:bldP spid="3" grpId="0"/>
       <p:bldP spid="3" grpId="1"/>
+      <p:bldP spid="17" grpId="1"/>
+      <p:bldP spid="19" grpId="1"/>
+      <p:bldP spid="20" grpId="1"/>
+      <p:bldP spid="16" grpId="0"/>
+      <p:bldP spid="7" grpId="1" animBg="1"/>
+      <p:bldP spid="8" grpId="0" animBg="1"/>
+      <p:bldP spid="9" grpId="0" animBg="1"/>
+      <p:bldP spid="10" grpId="0" animBg="1"/>
+      <p:bldP spid="11" grpId="0" animBg="1"/>
+      <p:bldP spid="12" grpId="0" animBg="1"/>
+      <p:bldP spid="13" grpId="0" animBg="1"/>
+      <p:bldP spid="14" grpId="0" animBg="1"/>
+      <p:bldP spid="15" grpId="0" animBg="1"/>
+      <p:bldP spid="17" grpId="2"/>
+      <p:bldP spid="20" grpId="2"/>
+      <p:bldP spid="19" grpId="2"/>
     </p:bldLst>
   </p:timing>
 </p:sld>
 </file>
 
 <file path=ppt/slides/slide7.xml><?xml version="1.0" encoding="utf-8"?>
-<p:sld xmlns:a="http://schemas.openxmlformats.org/drawingml/2006/main" xmlns:r="http://schemas.openxmlformats.org/officeDocument/2006/relationships" xmlns:p="http://schemas.openxmlformats.org/presentationml/2006/main">
-  <p:cSld>
-    <p:spTree>
-      <p:nvGrpSpPr>
-        <p:cNvPr id="1" name=""/>
-        <p:cNvGrpSpPr/>
-        <p:nvPr/>
-      </p:nvGrpSpPr>
-      <p:grpSpPr/>
-      <p:sp>
-        <p:nvSpPr>
-          <p:cNvPr id="4" name="文本框 3"/>
-          <p:cNvSpPr txBox="1"/>
-          <p:nvPr/>
-        </p:nvSpPr>
-        <p:spPr>
-          <a:xfrm>
-            <a:off x="214630" y="113665"/>
-            <a:ext cx="5088255" cy="460375"/>
-          </a:xfrm>
-          <a:prstGeom prst="rect">
-            <a:avLst/>
-          </a:prstGeom>
-          <a:noFill/>
-        </p:spPr>
-        <p:txBody>
-          <a:bodyPr wrap="square" rtlCol="0">
-            <a:spAutoFit/>
-          </a:bodyPr>
-          <a:p>
-            <a:r>
-              <a:rPr lang="en-US" altLang="zh-CN" sz="2400" b="1"/>
-              <a:t>Threat model</a:t>
-            </a:r>
-            <a:endParaRPr lang="en-US" altLang="zh-CN" sz="2400" b="1"/>
-          </a:p>
-        </p:txBody>
-      </p:sp>
-      <p:sp>
-        <p:nvSpPr>
-          <p:cNvPr id="5" name="文本框 4"/>
-          <p:cNvSpPr txBox="1"/>
-          <p:nvPr/>
-        </p:nvSpPr>
-        <p:spPr>
-          <a:xfrm>
-            <a:off x="376555" y="949325"/>
-            <a:ext cx="4807585" cy="2306955"/>
-          </a:xfrm>
-          <a:prstGeom prst="rect">
-            <a:avLst/>
-          </a:prstGeom>
-          <a:noFill/>
-        </p:spPr>
-        <p:txBody>
-          <a:bodyPr wrap="square" rtlCol="0">
-            <a:spAutoFit/>
-          </a:bodyPr>
-          <a:p>
-            <a:r>
-              <a:rPr lang="en-US" altLang="zh-CN" b="1">
-                <a:solidFill>
-                  <a:srgbClr val="FF0000"/>
-                </a:solidFill>
-              </a:rPr>
-              <a:t>Old Threat model:</a:t>
-            </a:r>
-            <a:r>
-              <a:rPr lang="en-US" altLang="zh-CN"/>
-              <a:t> Sybil nodes need to rely on other nodes to broadcast.</a:t>
-            </a:r>
-            <a:endParaRPr lang="en-US" altLang="zh-CN"/>
-          </a:p>
-          <a:p>
-            <a:endParaRPr lang="en-US" altLang="zh-CN"/>
-          </a:p>
-          <a:p>
-            <a:r>
-              <a:rPr lang="en-US" altLang="zh-CN" b="1">
-                <a:solidFill>
-                  <a:srgbClr val="FF0000"/>
-                </a:solidFill>
-              </a:rPr>
-              <a:t>Too strict</a:t>
-            </a:r>
-            <a:r>
-              <a:rPr lang="en-US" altLang="zh-CN"/>
-              <a:t>. In fact, attackers can use any other devices to broadcast signals on Sybil nodes behalf.</a:t>
-            </a:r>
-            <a:endParaRPr lang="en-US" altLang="zh-CN"/>
-          </a:p>
-          <a:p>
-            <a:endParaRPr lang="en-US" altLang="zh-CN"/>
-          </a:p>
-          <a:p>
-            <a:endParaRPr lang="en-US" altLang="zh-CN"/>
-          </a:p>
-        </p:txBody>
-      </p:sp>
-      <p:pic>
-        <p:nvPicPr>
-          <p:cNvPr id="6" name="图片 5" descr="AttackModel"/>
-          <p:cNvPicPr>
-            <a:picLocks noChangeAspect="1"/>
-          </p:cNvPicPr>
-          <p:nvPr/>
-        </p:nvPicPr>
-        <p:blipFill>
-          <a:blip r:embed="rId1"/>
-          <a:stretch>
-            <a:fillRect/>
-          </a:stretch>
-        </p:blipFill>
-        <p:spPr>
-          <a:xfrm>
-            <a:off x="6637655" y="949325"/>
-            <a:ext cx="3827145" cy="3661410"/>
-          </a:xfrm>
-          <a:prstGeom prst="rect">
-            <a:avLst/>
-          </a:prstGeom>
-        </p:spPr>
-      </p:pic>
-      <p:sp>
-        <p:nvSpPr>
-          <p:cNvPr id="7" name="文本框 6"/>
-          <p:cNvSpPr txBox="1"/>
-          <p:nvPr/>
-        </p:nvSpPr>
-        <p:spPr>
-          <a:xfrm>
-            <a:off x="6682740" y="4786630"/>
-            <a:ext cx="4323080" cy="368300"/>
-          </a:xfrm>
-          <a:prstGeom prst="rect">
-            <a:avLst/>
-          </a:prstGeom>
-          <a:noFill/>
-        </p:spPr>
-        <p:txBody>
-          <a:bodyPr wrap="square" rtlCol="0">
-            <a:spAutoFit/>
-          </a:bodyPr>
-          <a:p>
-            <a:r>
-              <a:rPr lang="en-US" altLang="zh-CN"/>
-              <a:t>Figure 6. Laptop help broadcast signals</a:t>
-            </a:r>
-            <a:endParaRPr lang="en-US" altLang="zh-CN"/>
-          </a:p>
-        </p:txBody>
-      </p:sp>
-      <p:sp>
-        <p:nvSpPr>
-          <p:cNvPr id="8" name="文本框 7"/>
-          <p:cNvSpPr txBox="1"/>
-          <p:nvPr/>
-        </p:nvSpPr>
-        <p:spPr>
-          <a:xfrm>
-            <a:off x="376555" y="3860165"/>
-            <a:ext cx="5077460" cy="1198880"/>
-          </a:xfrm>
-          <a:prstGeom prst="rect">
-            <a:avLst/>
-          </a:prstGeom>
-          <a:noFill/>
-        </p:spPr>
-        <p:txBody>
-          <a:bodyPr wrap="square" rtlCol="0">
-            <a:spAutoFit/>
-          </a:bodyPr>
-          <a:p>
-            <a:r>
-              <a:rPr lang="en-US" altLang="zh-CN" b="1">
-                <a:solidFill>
-                  <a:srgbClr val="FF0000"/>
-                </a:solidFill>
-              </a:rPr>
-              <a:t>New Threat model: </a:t>
-            </a:r>
-            <a:r>
-              <a:rPr lang="en-US" altLang="zh-CN">
-                <a:solidFill>
-                  <a:schemeClr val="tx1"/>
-                </a:solidFill>
-              </a:rPr>
-              <a:t>Attacker can use a laptop(more powerful CPU) to broadcast signals on Sybil nodes behalf.</a:t>
-            </a:r>
-            <a:endParaRPr lang="en-US" altLang="zh-CN">
-              <a:solidFill>
-                <a:schemeClr val="tx1"/>
-              </a:solidFill>
-            </a:endParaRPr>
-          </a:p>
-          <a:p>
-            <a:endParaRPr lang="en-US" altLang="zh-CN">
-              <a:solidFill>
-                <a:schemeClr val="tx1"/>
-              </a:solidFill>
-            </a:endParaRPr>
-          </a:p>
-        </p:txBody>
-      </p:sp>
-    </p:spTree>
-    <p:custDataLst>
-      <p:tags r:id="rId2"/>
-    </p:custDataLst>
-  </p:cSld>
-  <p:clrMapOvr>
-    <a:masterClrMapping/>
-  </p:clrMapOvr>
-</p:sld>
-</file>
-
-<file path=ppt/slides/slide8.xml><?xml version="1.0" encoding="utf-8"?>
 <p:sld xmlns:a="http://schemas.openxmlformats.org/drawingml/2006/main" xmlns:r="http://schemas.openxmlformats.org/officeDocument/2006/relationships" xmlns:p="http://schemas.openxmlformats.org/presentationml/2006/main">
   <p:cSld>
     <p:spTree>
@@ -11097,7 +11851,7 @@
         </p:blipFill>
         <p:spPr>
           <a:xfrm>
-            <a:off x="1196340" y="1880235"/>
+            <a:off x="1217295" y="1880235"/>
             <a:ext cx="4140200" cy="2927350"/>
           </a:xfrm>
           <a:prstGeom prst="rect">
@@ -11293,6 +12047,150 @@
           </a:p>
         </p:txBody>
       </p:sp>
+      <p:sp>
+        <p:nvSpPr>
+          <p:cNvPr id="7" name="椭圆 6"/>
+          <p:cNvSpPr/>
+          <p:nvPr/>
+        </p:nvSpPr>
+        <p:spPr>
+          <a:xfrm>
+            <a:off x="2532380" y="1796415"/>
+            <a:ext cx="2651125" cy="2166620"/>
+          </a:xfrm>
+          <a:prstGeom prst="ellipse">
+            <a:avLst/>
+          </a:prstGeom>
+          <a:noFill/>
+          <a:ln>
+            <a:solidFill>
+              <a:srgbClr val="FF0000"/>
+            </a:solidFill>
+          </a:ln>
+          <a:extLst>
+            <a:ext uri="{909E8E84-426E-40DD-AFC4-6F175D3DCCD1}">
+              <a14:hiddenFill xmlns:a14="http://schemas.microsoft.com/office/drawing/2010/main">
+                <a:solidFill>
+                  <a:schemeClr val="accent1"/>
+                </a:solidFill>
+              </a14:hiddenFill>
+            </a:ext>
+          </a:extLst>
+        </p:spPr>
+        <p:style>
+          <a:lnRef idx="2">
+            <a:schemeClr val="accent1">
+              <a:shade val="50000"/>
+            </a:schemeClr>
+          </a:lnRef>
+          <a:fillRef idx="1">
+            <a:schemeClr val="accent1"/>
+          </a:fillRef>
+          <a:effectRef idx="0">
+            <a:schemeClr val="accent1"/>
+          </a:effectRef>
+          <a:fontRef idx="minor">
+            <a:schemeClr val="lt1"/>
+          </a:fontRef>
+        </p:style>
+        <p:txBody>
+          <a:bodyPr rtlCol="0" anchor="ctr"/>
+          <a:p>
+            <a:pPr algn="ctr"/>
+            <a:endParaRPr lang="zh-CN" altLang="en-US"/>
+          </a:p>
+        </p:txBody>
+      </p:sp>
+      <p:sp>
+        <p:nvSpPr>
+          <p:cNvPr id="8" name="椭圆 7"/>
+          <p:cNvSpPr/>
+          <p:nvPr/>
+        </p:nvSpPr>
+        <p:spPr>
+          <a:xfrm>
+            <a:off x="7188835" y="2819400"/>
+            <a:ext cx="884555" cy="3121025"/>
+          </a:xfrm>
+          <a:prstGeom prst="ellipse">
+            <a:avLst/>
+          </a:prstGeom>
+          <a:noFill/>
+          <a:ln>
+            <a:solidFill>
+              <a:srgbClr val="FF0000"/>
+            </a:solidFill>
+          </a:ln>
+          <a:extLst>
+            <a:ext uri="{909E8E84-426E-40DD-AFC4-6F175D3DCCD1}">
+              <a14:hiddenFill xmlns:a14="http://schemas.microsoft.com/office/drawing/2010/main">
+                <a:solidFill>
+                  <a:schemeClr val="accent1"/>
+                </a:solidFill>
+              </a14:hiddenFill>
+            </a:ext>
+          </a:extLst>
+        </p:spPr>
+        <p:style>
+          <a:lnRef idx="2">
+            <a:schemeClr val="accent1">
+              <a:shade val="50000"/>
+            </a:schemeClr>
+          </a:lnRef>
+          <a:fillRef idx="1">
+            <a:schemeClr val="accent1"/>
+          </a:fillRef>
+          <a:effectRef idx="0">
+            <a:schemeClr val="accent1"/>
+          </a:effectRef>
+          <a:fontRef idx="minor">
+            <a:schemeClr val="lt1"/>
+          </a:fontRef>
+        </p:style>
+        <p:txBody>
+          <a:bodyPr rtlCol="0" anchor="ctr"/>
+          <a:p>
+            <a:pPr algn="ctr"/>
+            <a:endParaRPr lang="zh-CN" altLang="en-US"/>
+          </a:p>
+        </p:txBody>
+      </p:sp>
+      <p:sp>
+        <p:nvSpPr>
+          <p:cNvPr id="13" name="文本框 12"/>
+          <p:cNvSpPr txBox="1"/>
+          <p:nvPr/>
+        </p:nvSpPr>
+        <p:spPr>
+          <a:xfrm>
+            <a:off x="5680075" y="5864225"/>
+            <a:ext cx="4969510" cy="645160"/>
+          </a:xfrm>
+          <a:prstGeom prst="rect">
+            <a:avLst/>
+          </a:prstGeom>
+          <a:noFill/>
+        </p:spPr>
+        <p:txBody>
+          <a:bodyPr wrap="square" rtlCol="0">
+            <a:spAutoFit/>
+          </a:bodyPr>
+          <a:p>
+            <a:r>
+              <a:rPr lang="en-US" altLang="zh-CN"/>
+              <a:t>S1 S2 are two broadcasting nodes</a:t>
+            </a:r>
+            <a:endParaRPr lang="en-US" altLang="zh-CN"/>
+          </a:p>
+          <a:p>
+            <a:r>
+              <a:rPr lang="en-US" altLang="zh-CN"/>
+              <a:t>D1 D2 are two listening nodes</a:t>
+            </a:r>
+            <a:endParaRPr lang="en-US" altLang="zh-CN"/>
+          </a:p>
+        </p:txBody>
+      </p:sp>
     </p:spTree>
     <p:custDataLst>
       <p:tags r:id="rId5"/>
@@ -11301,10 +12199,168 @@
   <p:clrMapOvr>
     <a:masterClrMapping/>
   </p:clrMapOvr>
+  <p:timing>
+    <p:tnLst>
+      <p:par>
+        <p:cTn id="1" dur="indefinite" restart="never" nodeType="tmRoot">
+          <p:childTnLst>
+            <p:seq concurrent="1" nextAc="seek">
+              <p:cTn id="2" dur="indefinite" nodeType="mainSeq">
+                <p:childTnLst>
+                  <p:par>
+                    <p:cTn id="3" fill="hold">
+                      <p:stCondLst>
+                        <p:cond delay="indefinite"/>
+                      </p:stCondLst>
+                      <p:childTnLst>
+                        <p:par>
+                          <p:cTn id="4" fill="hold">
+                            <p:stCondLst>
+                              <p:cond delay="0"/>
+                            </p:stCondLst>
+                            <p:childTnLst>
+                              <p:par>
+                                <p:cTn id="5" presetID="22" presetClass="entr" presetSubtype="4" fill="hold" grpId="0" nodeType="clickEffect">
+                                  <p:stCondLst>
+                                    <p:cond delay="0"/>
+                                  </p:stCondLst>
+                                  <p:childTnLst>
+                                    <p:set>
+                                      <p:cBhvr>
+                                        <p:cTn id="6" dur="1" fill="hold">
+                                          <p:stCondLst>
+                                            <p:cond delay="0"/>
+                                          </p:stCondLst>
+                                        </p:cTn>
+                                        <p:tgtEl>
+                                          <p:spTgt spid="8"/>
+                                        </p:tgtEl>
+                                        <p:attrNameLst>
+                                          <p:attrName>style.visibility</p:attrName>
+                                        </p:attrNameLst>
+                                      </p:cBhvr>
+                                      <p:to>
+                                        <p:strVal val="visible"/>
+                                      </p:to>
+                                    </p:set>
+                                    <p:animEffect transition="in" filter="wipe(down)">
+                                      <p:cBhvr>
+                                        <p:cTn id="7" dur="500"/>
+                                        <p:tgtEl>
+                                          <p:spTgt spid="8"/>
+                                        </p:tgtEl>
+                                      </p:cBhvr>
+                                    </p:animEffect>
+                                  </p:childTnLst>
+                                </p:cTn>
+                              </p:par>
+                              <p:par>
+                                <p:cTn id="8" presetID="22" presetClass="entr" presetSubtype="4" fill="hold" grpId="0" nodeType="withEffect">
+                                  <p:stCondLst>
+                                    <p:cond delay="0"/>
+                                  </p:stCondLst>
+                                  <p:childTnLst>
+                                    <p:set>
+                                      <p:cBhvr>
+                                        <p:cTn id="9" dur="1" fill="hold">
+                                          <p:stCondLst>
+                                            <p:cond delay="0"/>
+                                          </p:stCondLst>
+                                        </p:cTn>
+                                        <p:tgtEl>
+                                          <p:spTgt spid="7"/>
+                                        </p:tgtEl>
+                                        <p:attrNameLst>
+                                          <p:attrName>style.visibility</p:attrName>
+                                        </p:attrNameLst>
+                                      </p:cBhvr>
+                                      <p:to>
+                                        <p:strVal val="visible"/>
+                                      </p:to>
+                                    </p:set>
+                                    <p:animEffect transition="in" filter="wipe(down)">
+                                      <p:cBhvr>
+                                        <p:cTn id="10" dur="500"/>
+                                        <p:tgtEl>
+                                          <p:spTgt spid="7"/>
+                                        </p:tgtEl>
+                                      </p:cBhvr>
+                                    </p:animEffect>
+                                  </p:childTnLst>
+                                </p:cTn>
+                              </p:par>
+                              <p:par>
+                                <p:cTn id="11" presetID="22" presetClass="entr" presetSubtype="4" fill="hold" grpId="0" nodeType="withEffect">
+                                  <p:stCondLst>
+                                    <p:cond delay="0"/>
+                                  </p:stCondLst>
+                                  <p:childTnLst>
+                                    <p:set>
+                                      <p:cBhvr>
+                                        <p:cTn id="12" dur="1" fill="hold">
+                                          <p:stCondLst>
+                                            <p:cond delay="0"/>
+                                          </p:stCondLst>
+                                        </p:cTn>
+                                        <p:tgtEl>
+                                          <p:spTgt spid="13"/>
+                                        </p:tgtEl>
+                                        <p:attrNameLst>
+                                          <p:attrName>style.visibility</p:attrName>
+                                        </p:attrNameLst>
+                                      </p:cBhvr>
+                                      <p:to>
+                                        <p:strVal val="visible"/>
+                                      </p:to>
+                                    </p:set>
+                                    <p:animEffect transition="in" filter="wipe(down)">
+                                      <p:cBhvr>
+                                        <p:cTn id="13" dur="500"/>
+                                        <p:tgtEl>
+                                          <p:spTgt spid="13"/>
+                                        </p:tgtEl>
+                                      </p:cBhvr>
+                                    </p:animEffect>
+                                  </p:childTnLst>
+                                </p:cTn>
+                              </p:par>
+                            </p:childTnLst>
+                          </p:cTn>
+                        </p:par>
+                      </p:childTnLst>
+                    </p:cTn>
+                  </p:par>
+                </p:childTnLst>
+              </p:cTn>
+              <p:prevCondLst>
+                <p:cond evt="onPrev" delay="0">
+                  <p:tgtEl>
+                    <p:sldTgt/>
+                  </p:tgtEl>
+                </p:cond>
+              </p:prevCondLst>
+              <p:nextCondLst>
+                <p:cond evt="onNext" delay="0">
+                  <p:tgtEl>
+                    <p:sldTgt/>
+                  </p:tgtEl>
+                </p:cond>
+              </p:nextCondLst>
+            </p:seq>
+          </p:childTnLst>
+        </p:cTn>
+      </p:par>
+    </p:tnLst>
+    <p:bldLst>
+      <p:bldP spid="8" grpId="0" animBg="1"/>
+      <p:bldP spid="7" grpId="0" animBg="1"/>
+      <p:bldP spid="13" grpId="0"/>
+    </p:bldLst>
+  </p:timing>
 </p:sld>
 </file>
 
-<file path=ppt/slides/slide9.xml><?xml version="1.0" encoding="utf-8"?>
+<file path=ppt/slides/slide8.xml><?xml version="1.0" encoding="utf-8"?>
 <p:sld xmlns:a="http://schemas.openxmlformats.org/drawingml/2006/main" xmlns:r="http://schemas.openxmlformats.org/officeDocument/2006/relationships" xmlns:p="http://schemas.openxmlformats.org/presentationml/2006/main">
   <p:cSld>
     <p:spTree>
@@ -11391,8 +12447,8 @@
           </p:nvPr>
         </p:nvGraphicFramePr>
         <p:xfrm>
-          <a:off x="581660" y="1703705"/>
-          <a:ext cx="6657975" cy="3450590"/>
+          <a:off x="592455" y="1681480"/>
+          <a:ext cx="5446395" cy="3688080"/>
         </p:xfrm>
         <a:graphic>
           <a:graphicData uri="http://schemas.openxmlformats.org/drawingml/2006/table">
@@ -11401,12 +12457,12 @@
                 <a:tableStyleId>{5C22544A-7EE6-4342-B048-85BDC9FD1C3A}</a:tableStyleId>
               </a:tblPr>
               <a:tblGrid>
-                <a:gridCol w="1218565"/>
-                <a:gridCol w="1040765"/>
-                <a:gridCol w="1263015"/>
-                <a:gridCol w="1196975"/>
-                <a:gridCol w="1218565"/>
-                <a:gridCol w="720090"/>
+                <a:gridCol w="1022350"/>
+                <a:gridCol w="765810"/>
+                <a:gridCol w="719801"/>
+                <a:gridCol w="788647"/>
+                <a:gridCol w="827405"/>
+                <a:gridCol w="1322070"/>
               </a:tblGrid>
               <a:tr h="402590">
                 <a:tc>
@@ -11416,6 +12472,10 @@
                       <a:pPr>
                         <a:buNone/>
                       </a:pPr>
+                      <a:r>
+                        <a:rPr lang="en-US" altLang="zh-CN"/>
+                        <a:t>Round</a:t>
+                      </a:r>
                       <a:endParaRPr lang="en-US" altLang="zh-CN"/>
                     </a:p>
                   </a:txBody>
@@ -11429,10 +12489,12 @@
                         <a:buNone/>
                       </a:pPr>
                       <a:r>
-                        <a:rPr lang="en-US" altLang="zh-CN"/>
-                        <a:t>Round1</a:t>
+                        <a:rPr lang="en-US" altLang="zh-CN" sz="1800">
+                          <a:sym typeface="+mn-ea"/>
+                        </a:rPr>
+                        <a:t>1</a:t>
                       </a:r>
-                      <a:endParaRPr lang="en-US" altLang="zh-CN"/>
+                      <a:endParaRPr lang="en-US" altLang="zh-CN" sz="1800"/>
                     </a:p>
                   </a:txBody>
                   <a:tcPr/>
@@ -11445,10 +12507,16 @@
                         <a:buNone/>
                       </a:pPr>
                       <a:r>
-                        <a:rPr lang="en-US" altLang="zh-CN"/>
-                        <a:t>Round2</a:t>
+                        <a:rPr lang="en-US" altLang="zh-CN" sz="1800"/>
+                        <a:t>2</a:t>
                       </a:r>
-                      <a:endParaRPr lang="en-US" altLang="zh-CN"/>
+                      <a:endParaRPr lang="en-US" altLang="zh-CN" sz="1800"/>
+                    </a:p>
+                    <a:p>
+                      <a:pPr>
+                        <a:buNone/>
+                      </a:pPr>
+                      <a:endParaRPr lang="en-US" altLang="zh-CN" sz="1800"/>
                     </a:p>
                   </a:txBody>
                   <a:tcPr/>
@@ -11462,7 +12530,7 @@
                       </a:pPr>
                       <a:r>
                         <a:rPr lang="en-US" altLang="zh-CN"/>
-                        <a:t>Round3</a:t>
+                        <a:t>3</a:t>
                       </a:r>
                       <a:endParaRPr lang="en-US" altLang="zh-CN"/>
                     </a:p>
@@ -11478,7 +12546,7 @@
                       </a:pPr>
                       <a:r>
                         <a:rPr lang="en-US" altLang="zh-CN"/>
-                        <a:t>Round4</a:t>
+                        <a:t>4</a:t>
                       </a:r>
                       <a:endParaRPr lang="en-US" altLang="zh-CN"/>
                     </a:p>
@@ -11528,7 +12596,7 @@
                       </a:pPr>
                       <a:r>
                         <a:rPr lang="en-US" altLang="zh-CN"/>
-                        <a:t>L</a:t>
+                        <a:t>B</a:t>
                       </a:r>
                       <a:endParaRPr lang="en-US" altLang="zh-CN"/>
                     </a:p>
@@ -11544,7 +12612,7 @@
                       </a:pPr>
                       <a:r>
                         <a:rPr lang="en-US" altLang="zh-CN"/>
-                        <a:t>B</a:t>
+                        <a:t>L</a:t>
                       </a:r>
                       <a:endParaRPr lang="en-US" altLang="zh-CN"/>
                     </a:p>
@@ -11560,7 +12628,7 @@
                       </a:pPr>
                       <a:r>
                         <a:rPr lang="en-US" altLang="zh-CN"/>
-                        <a:t>L</a:t>
+                        <a:t>B</a:t>
                       </a:r>
                       <a:endParaRPr lang="en-US" altLang="zh-CN"/>
                     </a:p>
@@ -11576,7 +12644,7 @@
                       </a:pPr>
                       <a:r>
                         <a:rPr lang="en-US" altLang="zh-CN"/>
-                        <a:t>B</a:t>
+                        <a:t>L</a:t>
                       </a:r>
                       <a:endParaRPr lang="en-US" altLang="zh-CN"/>
                     </a:p>
@@ -11626,7 +12694,7 @@
                       </a:pPr>
                       <a:r>
                         <a:rPr lang="en-US" altLang="zh-CN"/>
-                        <a:t>L</a:t>
+                        <a:t>B</a:t>
                       </a:r>
                       <a:endParaRPr lang="en-US" altLang="zh-CN"/>
                     </a:p>
@@ -11642,7 +12710,7 @@
                       </a:pPr>
                       <a:r>
                         <a:rPr lang="en-US" altLang="zh-CN"/>
-                        <a:t>B</a:t>
+                        <a:t>L</a:t>
                       </a:r>
                       <a:endParaRPr lang="en-US" altLang="zh-CN"/>
                     </a:p>
@@ -11658,7 +12726,7 @@
                       </a:pPr>
                       <a:r>
                         <a:rPr lang="en-US" altLang="zh-CN"/>
-                        <a:t>L</a:t>
+                        <a:t>B</a:t>
                       </a:r>
                       <a:endParaRPr lang="en-US" altLang="zh-CN"/>
                     </a:p>
@@ -11674,7 +12742,7 @@
                       </a:pPr>
                       <a:r>
                         <a:rPr lang="en-US" altLang="zh-CN"/>
-                        <a:t>B</a:t>
+                        <a:t>L</a:t>
                       </a:r>
                       <a:endParaRPr lang="en-US" altLang="zh-CN"/>
                     </a:p>
@@ -11732,7 +12800,7 @@
                       </a:pPr>
                       <a:r>
                         <a:rPr lang="en-US" altLang="zh-CN"/>
-                        <a:t>L</a:t>
+                        <a:t>B</a:t>
                       </a:r>
                       <a:endParaRPr lang="en-US" altLang="zh-CN"/>
                     </a:p>
@@ -11748,7 +12816,7 @@
                       </a:pPr>
                       <a:r>
                         <a:rPr lang="en-US" altLang="zh-CN"/>
-                        <a:t>B</a:t>
+                        <a:t>L</a:t>
                       </a:r>
                       <a:endParaRPr lang="en-US" altLang="zh-CN"/>
                     </a:p>
@@ -11764,7 +12832,7 @@
                       </a:pPr>
                       <a:r>
                         <a:rPr lang="en-US" altLang="zh-CN"/>
-                        <a:t>B</a:t>
+                        <a:t>L</a:t>
                       </a:r>
                       <a:endParaRPr lang="en-US" altLang="zh-CN"/>
                     </a:p>
@@ -11780,7 +12848,7 @@
                       </a:pPr>
                       <a:r>
                         <a:rPr lang="en-US" altLang="zh-CN"/>
-                        <a:t>L</a:t>
+                        <a:t>B</a:t>
                       </a:r>
                       <a:endParaRPr lang="en-US" altLang="zh-CN"/>
                     </a:p>
@@ -11830,7 +12898,7 @@
                       </a:pPr>
                       <a:r>
                         <a:rPr lang="en-US" altLang="zh-CN"/>
-                        <a:t>L</a:t>
+                        <a:t>B</a:t>
                       </a:r>
                       <a:endParaRPr lang="en-US" altLang="zh-CN"/>
                     </a:p>
@@ -11846,7 +12914,7 @@
                       </a:pPr>
                       <a:r>
                         <a:rPr lang="en-US" altLang="zh-CN"/>
-                        <a:t>B</a:t>
+                        <a:t>L</a:t>
                       </a:r>
                       <a:endParaRPr lang="en-US" altLang="zh-CN"/>
                     </a:p>
@@ -11862,7 +12930,7 @@
                       </a:pPr>
                       <a:r>
                         <a:rPr lang="en-US" altLang="zh-CN"/>
-                        <a:t>B</a:t>
+                        <a:t>L</a:t>
                       </a:r>
                       <a:endParaRPr lang="en-US" altLang="zh-CN"/>
                     </a:p>
@@ -11878,7 +12946,7 @@
                       </a:pPr>
                       <a:r>
                         <a:rPr lang="en-US" altLang="zh-CN"/>
-                        <a:t>L</a:t>
+                        <a:t>B</a:t>
                       </a:r>
                       <a:endParaRPr lang="en-US" altLang="zh-CN"/>
                     </a:p>
@@ -11928,7 +12996,7 @@
                       </a:pPr>
                       <a:r>
                         <a:rPr lang="en-US" altLang="zh-CN"/>
-                        <a:t>B</a:t>
+                        <a:t>L</a:t>
                       </a:r>
                       <a:endParaRPr lang="en-US" altLang="zh-CN"/>
                     </a:p>
@@ -11944,7 +13012,7 @@
                       </a:pPr>
                       <a:r>
                         <a:rPr lang="en-US" altLang="zh-CN"/>
-                        <a:t>L</a:t>
+                        <a:t>B</a:t>
                       </a:r>
                       <a:endParaRPr lang="en-US" altLang="zh-CN"/>
                     </a:p>
@@ -11960,7 +13028,7 @@
                       </a:pPr>
                       <a:r>
                         <a:rPr lang="en-US" altLang="zh-CN"/>
-                        <a:t>L</a:t>
+                        <a:t>B</a:t>
                       </a:r>
                       <a:endParaRPr lang="en-US" altLang="zh-CN"/>
                     </a:p>
@@ -11976,7 +13044,7 @@
                       </a:pPr>
                       <a:r>
                         <a:rPr lang="en-US" altLang="zh-CN"/>
-                        <a:t>B</a:t>
+                        <a:t>L</a:t>
                       </a:r>
                       <a:endParaRPr lang="en-US" altLang="zh-CN"/>
                     </a:p>
@@ -12034,7 +13102,7 @@
                       </a:pPr>
                       <a:r>
                         <a:rPr lang="en-US" altLang="zh-CN"/>
-                        <a:t>B</a:t>
+                        <a:t>L</a:t>
                       </a:r>
                       <a:endParaRPr lang="en-US" altLang="zh-CN"/>
                     </a:p>
@@ -12050,7 +13118,7 @@
                       </a:pPr>
                       <a:r>
                         <a:rPr lang="en-US" altLang="zh-CN"/>
-                        <a:t>L</a:t>
+                        <a:t>B</a:t>
                       </a:r>
                       <a:endParaRPr lang="en-US" altLang="zh-CN"/>
                     </a:p>
@@ -12066,7 +13134,7 @@
                       </a:pPr>
                       <a:r>
                         <a:rPr lang="en-US" altLang="zh-CN"/>
-                        <a:t>L</a:t>
+                        <a:t>B</a:t>
                       </a:r>
                       <a:endParaRPr lang="en-US" altLang="zh-CN"/>
                     </a:p>
@@ -12082,7 +13150,7 @@
                       </a:pPr>
                       <a:r>
                         <a:rPr lang="en-US" altLang="zh-CN"/>
-                        <a:t>B</a:t>
+                        <a:t>L</a:t>
                       </a:r>
                       <a:endParaRPr lang="en-US" altLang="zh-CN"/>
                     </a:p>
@@ -12140,7 +13208,7 @@
                       </a:pPr>
                       <a:r>
                         <a:rPr lang="en-US" altLang="zh-CN"/>
-                        <a:t>B</a:t>
+                        <a:t>L</a:t>
                       </a:r>
                       <a:endParaRPr lang="en-US" altLang="zh-CN"/>
                     </a:p>
@@ -12156,7 +13224,7 @@
                       </a:pPr>
                       <a:r>
                         <a:rPr lang="en-US" altLang="zh-CN"/>
-                        <a:t>L</a:t>
+                        <a:t>B</a:t>
                       </a:r>
                       <a:endParaRPr lang="en-US" altLang="zh-CN"/>
                     </a:p>
@@ -12172,7 +13240,7 @@
                       </a:pPr>
                       <a:r>
                         <a:rPr lang="en-US" altLang="zh-CN"/>
-                        <a:t>B</a:t>
+                        <a:t>L</a:t>
                       </a:r>
                       <a:endParaRPr lang="en-US" altLang="zh-CN"/>
                     </a:p>
@@ -12188,7 +13256,7 @@
                       </a:pPr>
                       <a:r>
                         <a:rPr lang="en-US" altLang="zh-CN"/>
-                        <a:t>L</a:t>
+                        <a:t>B</a:t>
                       </a:r>
                       <a:endParaRPr lang="en-US" altLang="zh-CN"/>
                     </a:p>
@@ -12238,7 +13306,7 @@
                       </a:pPr>
                       <a:r>
                         <a:rPr lang="en-US" altLang="zh-CN"/>
-                        <a:t>B</a:t>
+                        <a:t>L</a:t>
                       </a:r>
                       <a:endParaRPr lang="en-US" altLang="zh-CN"/>
                     </a:p>
@@ -12254,7 +13322,7 @@
                       </a:pPr>
                       <a:r>
                         <a:rPr lang="en-US" altLang="zh-CN"/>
-                        <a:t>L</a:t>
+                        <a:t>B</a:t>
                       </a:r>
                       <a:endParaRPr lang="en-US" altLang="zh-CN"/>
                     </a:p>
@@ -12270,7 +13338,7 @@
                       </a:pPr>
                       <a:r>
                         <a:rPr lang="en-US" altLang="zh-CN"/>
-                        <a:t>B</a:t>
+                        <a:t>L</a:t>
                       </a:r>
                       <a:endParaRPr lang="en-US" altLang="zh-CN"/>
                     </a:p>
@@ -12286,7 +13354,7 @@
                       </a:pPr>
                       <a:r>
                         <a:rPr lang="en-US" altLang="zh-CN"/>
-                        <a:t>L</a:t>
+                        <a:t>B</a:t>
                       </a:r>
                       <a:endParaRPr lang="en-US" altLang="zh-CN"/>
                     </a:p>
@@ -12322,7 +13390,7 @@
         </p:nvSpPr>
         <p:spPr>
           <a:xfrm>
-            <a:off x="592455" y="6263640"/>
+            <a:off x="592455" y="5567045"/>
             <a:ext cx="6316980" cy="368300"/>
           </a:xfrm>
           <a:prstGeom prst="rect">
@@ -12337,36 +13405,12 @@
           <a:p>
             <a:r>
               <a:rPr lang="en-US" altLang="zh-CN"/>
-              <a:t>Figure 7. Sentry based voting system in round 2</a:t>
+              <a:t>Figure 7. Sentry based voting system in round 1</a:t>
             </a:r>
             <a:endParaRPr lang="en-US" altLang="zh-CN"/>
           </a:p>
         </p:txBody>
       </p:sp>
-      <p:pic>
-        <p:nvPicPr>
-          <p:cNvPr id="15" name="图片 14" descr="broadcast2ratio"/>
-          <p:cNvPicPr>
-            <a:picLocks noChangeAspect="1"/>
-          </p:cNvPicPr>
-          <p:nvPr/>
-        </p:nvPicPr>
-        <p:blipFill>
-          <a:blip r:embed="rId2"/>
-          <a:stretch>
-            <a:fillRect/>
-          </a:stretch>
-        </p:blipFill>
-        <p:spPr>
-          <a:xfrm>
-            <a:off x="581660" y="1703705"/>
-            <a:ext cx="6777355" cy="4507230"/>
-          </a:xfrm>
-          <a:prstGeom prst="rect">
-            <a:avLst/>
-          </a:prstGeom>
-        </p:spPr>
-      </p:pic>
       <p:sp>
         <p:nvSpPr>
           <p:cNvPr id="2" name="文本框 1"/>
@@ -12561,37 +13605,13 @@
           </a:p>
         </p:txBody>
       </p:sp>
-      <p:pic>
-        <p:nvPicPr>
-          <p:cNvPr id="4" name="图片 3" descr="broadcast2ratio_sybil"/>
-          <p:cNvPicPr>
-            <a:picLocks noChangeAspect="1"/>
-          </p:cNvPicPr>
-          <p:nvPr/>
-        </p:nvPicPr>
-        <p:blipFill>
-          <a:blip r:embed="rId3"/>
-          <a:stretch>
-            <a:fillRect/>
-          </a:stretch>
-        </p:blipFill>
-        <p:spPr>
-          <a:xfrm>
-            <a:off x="552450" y="1703705"/>
-            <a:ext cx="7056755" cy="4057650"/>
-          </a:xfrm>
-          <a:prstGeom prst="rect">
-            <a:avLst/>
-          </a:prstGeom>
-        </p:spPr>
-      </p:pic>
       <p:graphicFrame>
         <p:nvGraphicFramePr>
           <p:cNvPr id="9" name="表格 8"/>
           <p:cNvGraphicFramePr/>
           <p:nvPr>
             <p:custDataLst>
-              <p:tags r:id="rId4"/>
+              <p:tags r:id="rId2"/>
             </p:custDataLst>
           </p:nvPr>
         </p:nvGraphicFramePr>
@@ -12629,7 +13649,7 @@
                             <a:schemeClr val="bg1"/>
                           </a:solidFill>
                         </a:rPr>
-                        <a:t>i</a:t>
+                        <a:t>1</a:t>
                       </a:r>
                       <a:endParaRPr lang="en-US" altLang="zh-CN">
                         <a:solidFill>
@@ -12653,7 +13673,7 @@
                             <a:schemeClr val="bg1"/>
                           </a:solidFill>
                         </a:rPr>
-                        <a:t>ii</a:t>
+                        <a:t>2</a:t>
                       </a:r>
                       <a:endParaRPr lang="en-US" altLang="zh-CN">
                         <a:solidFill>
@@ -12673,7 +13693,7 @@
                       </a:pPr>
                       <a:r>
                         <a:rPr lang="en-US" altLang="zh-CN"/>
-                        <a:t>iii</a:t>
+                        <a:t>3</a:t>
                       </a:r>
                       <a:endParaRPr lang="en-US" altLang="zh-CN"/>
                     </a:p>
@@ -12693,7 +13713,7 @@
                             <a:schemeClr val="bg1"/>
                           </a:solidFill>
                         </a:rPr>
-                        <a:t>iv</a:t>
+                        <a:t>4</a:t>
                       </a:r>
                       <a:endParaRPr lang="en-US" altLang="zh-CN">
                         <a:solidFill>
@@ -12713,7 +13733,7 @@
                       </a:pPr>
                       <a:r>
                         <a:rPr lang="en-US" altLang="zh-CN"/>
-                        <a:t>v</a:t>
+                        <a:t>5</a:t>
                       </a:r>
                       <a:endParaRPr lang="en-US" altLang="zh-CN"/>
                     </a:p>
@@ -12729,7 +13749,7 @@
                       </a:pPr>
                       <a:r>
                         <a:rPr lang="en-US" altLang="zh-CN"/>
-                        <a:t>vi</a:t>
+                        <a:t>6</a:t>
                       </a:r>
                       <a:endParaRPr lang="en-US" altLang="zh-CN"/>
                     </a:p>
@@ -12749,7 +13769,7 @@
                             <a:schemeClr val="bg1"/>
                           </a:solidFill>
                         </a:rPr>
-                        <a:t>vii</a:t>
+                        <a:t>7</a:t>
                       </a:r>
                       <a:endParaRPr lang="en-US" altLang="zh-CN">
                         <a:solidFill>
@@ -12769,7 +13789,7 @@
                       </a:pPr>
                       <a:r>
                         <a:rPr lang="en-US" altLang="zh-CN"/>
-                        <a:t>viii</a:t>
+                        <a:t>8</a:t>
                       </a:r>
                       <a:endParaRPr lang="en-US" altLang="zh-CN"/>
                     </a:p>
@@ -12919,7 +13939,7 @@
         </p:nvSpPr>
         <p:spPr>
           <a:xfrm>
-            <a:off x="8019415" y="1677035"/>
+            <a:off x="8087995" y="1977390"/>
             <a:ext cx="3448685" cy="3692525"/>
           </a:xfrm>
           <a:prstGeom prst="rect">
@@ -12985,7 +14005,113 @@
       </p:sp>
       <p:pic>
         <p:nvPicPr>
-          <p:cNvPr id="11" name="图片 10" descr="broadcast2ratio_FN"/>
+          <p:cNvPr id="19" name="图片 18" descr="broadcast2ratio_sybil"/>
+          <p:cNvPicPr>
+            <a:picLocks noChangeAspect="1"/>
+          </p:cNvPicPr>
+          <p:nvPr/>
+        </p:nvPicPr>
+        <p:blipFill>
+          <a:blip r:embed="rId3"/>
+          <a:stretch>
+            <a:fillRect/>
+          </a:stretch>
+        </p:blipFill>
+        <p:spPr>
+          <a:xfrm>
+            <a:off x="592455" y="1977390"/>
+            <a:ext cx="5372100" cy="3295650"/>
+          </a:xfrm>
+          <a:prstGeom prst="rect">
+            <a:avLst/>
+          </a:prstGeom>
+        </p:spPr>
+      </p:pic>
+      <p:pic>
+        <p:nvPicPr>
+          <p:cNvPr id="20" name="图片 19" descr="broadcast2ratio_FP"/>
+          <p:cNvPicPr>
+            <a:picLocks noChangeAspect="1"/>
+          </p:cNvPicPr>
+          <p:nvPr/>
+        </p:nvPicPr>
+        <p:blipFill>
+          <a:blip r:embed="rId4"/>
+          <a:stretch>
+            <a:fillRect/>
+          </a:stretch>
+        </p:blipFill>
+        <p:spPr>
+          <a:xfrm>
+            <a:off x="581660" y="1797685"/>
+            <a:ext cx="5314950" cy="3571875"/>
+          </a:xfrm>
+          <a:prstGeom prst="rect">
+            <a:avLst/>
+          </a:prstGeom>
+        </p:spPr>
+      </p:pic>
+      <p:sp>
+        <p:nvSpPr>
+          <p:cNvPr id="22" name="文本框 21"/>
+          <p:cNvSpPr txBox="1"/>
+          <p:nvPr/>
+        </p:nvSpPr>
+        <p:spPr>
+          <a:xfrm>
+            <a:off x="592455" y="5567045"/>
+            <a:ext cx="6316980" cy="368300"/>
+          </a:xfrm>
+          <a:prstGeom prst="rect">
+            <a:avLst/>
+          </a:prstGeom>
+          <a:noFill/>
+        </p:spPr>
+        <p:txBody>
+          <a:bodyPr wrap="square" rtlCol="0">
+            <a:spAutoFit/>
+          </a:bodyPr>
+          <a:p>
+            <a:r>
+              <a:rPr lang="en-US" altLang="zh-CN"/>
+              <a:t>Figure 7. Sentry based voting system in round 2</a:t>
+            </a:r>
+            <a:endParaRPr lang="en-US" altLang="zh-CN"/>
+          </a:p>
+        </p:txBody>
+      </p:sp>
+      <p:sp>
+        <p:nvSpPr>
+          <p:cNvPr id="23" name="文本框 22"/>
+          <p:cNvSpPr txBox="1"/>
+          <p:nvPr/>
+        </p:nvSpPr>
+        <p:spPr>
+          <a:xfrm>
+            <a:off x="592455" y="5567045"/>
+            <a:ext cx="6316980" cy="368300"/>
+          </a:xfrm>
+          <a:prstGeom prst="rect">
+            <a:avLst/>
+          </a:prstGeom>
+          <a:noFill/>
+        </p:spPr>
+        <p:txBody>
+          <a:bodyPr wrap="square" rtlCol="0">
+            <a:spAutoFit/>
+          </a:bodyPr>
+          <a:p>
+            <a:r>
+              <a:rPr lang="en-US" altLang="zh-CN"/>
+              <a:t>Figure 7. Sentry based voting system in round 1</a:t>
+            </a:r>
+            <a:endParaRPr lang="en-US" altLang="zh-CN"/>
+          </a:p>
+        </p:txBody>
+      </p:sp>
+      <p:pic>
+        <p:nvPicPr>
+          <p:cNvPr id="24" name="图片 23" descr="broadcast2ratio_FN"/>
           <p:cNvPicPr>
             <a:picLocks noChangeAspect="1"/>
           </p:cNvPicPr>
@@ -12999,32 +14125,8 @@
         </p:blipFill>
         <p:spPr>
           <a:xfrm>
-            <a:off x="574040" y="1857375"/>
-            <a:ext cx="6943725" cy="3903980"/>
-          </a:xfrm>
-          <a:prstGeom prst="rect">
-            <a:avLst/>
-          </a:prstGeom>
-        </p:spPr>
-      </p:pic>
-      <p:pic>
-        <p:nvPicPr>
-          <p:cNvPr id="12" name="图片 11" descr="broadcast2ratio_FP"/>
-          <p:cNvPicPr>
-            <a:picLocks noChangeAspect="1"/>
-          </p:cNvPicPr>
-          <p:nvPr/>
-        </p:nvPicPr>
-        <p:blipFill>
-          <a:blip r:embed="rId6"/>
-          <a:stretch>
-            <a:fillRect/>
-          </a:stretch>
-        </p:blipFill>
-        <p:spPr>
-          <a:xfrm>
-            <a:off x="552450" y="1927225"/>
-            <a:ext cx="6519545" cy="4282440"/>
+            <a:off x="640715" y="2045335"/>
+            <a:ext cx="5524500" cy="3324225"/>
           </a:xfrm>
           <a:prstGeom prst="rect">
             <a:avLst/>
@@ -13033,7 +14135,7 @@
       </p:pic>
     </p:spTree>
     <p:custDataLst>
-      <p:tags r:id="rId7"/>
+      <p:tags r:id="rId6"/>
     </p:custDataLst>
   </p:cSld>
   <p:clrMapOvr>
@@ -13060,7 +14162,7 @@
                             </p:stCondLst>
                             <p:childTnLst>
                               <p:par>
-                                <p:cTn id="5" presetID="3" presetClass="entr" presetSubtype="10" fill="hold" nodeType="clickEffect">
+                                <p:cTn id="5" presetID="22" presetClass="entr" presetSubtype="4" fill="hold" nodeType="clickEffect">
                                   <p:stCondLst>
                                     <p:cond delay="0"/>
                                   </p:stCondLst>
@@ -13068,6 +14170,41 @@
                                     <p:set>
                                       <p:cBhvr>
                                         <p:cTn id="6" dur="1" fill="hold">
+                                          <p:stCondLst>
+                                            <p:cond delay="0"/>
+                                          </p:stCondLst>
+                                        </p:cTn>
+                                        <p:tgtEl>
+                                          <p:spTgt spid="10"/>
+                                        </p:tgtEl>
+                                        <p:attrNameLst>
+                                          <p:attrName>style.visibility</p:attrName>
+                                        </p:attrNameLst>
+                                      </p:cBhvr>
+                                      <p:to>
+                                        <p:strVal val="visible"/>
+                                      </p:to>
+                                    </p:set>
+                                    <p:animEffect transition="in" filter="wipe(down)">
+                                      <p:cBhvr>
+                                        <p:cTn id="7" dur="500"/>
+                                        <p:tgtEl>
+                                          <p:spTgt spid="10"/>
+                                        </p:tgtEl>
+                                      </p:cBhvr>
+                                    </p:animEffect>
+                                  </p:childTnLst>
+                                </p:cTn>
+                              </p:par>
+                              <p:par>
+                                <p:cTn id="8" presetID="22" presetClass="entr" presetSubtype="4" fill="hold" nodeType="withEffect">
+                                  <p:stCondLst>
+                                    <p:cond delay="0"/>
+                                  </p:stCondLst>
+                                  <p:childTnLst>
+                                    <p:set>
+                                      <p:cBhvr>
+                                        <p:cTn id="9" dur="1" fill="hold">
                                           <p:stCondLst>
                                             <p:cond delay="0"/>
                                           </p:stCondLst>
@@ -13083,9 +14220,9 @@
                                         <p:strVal val="visible"/>
                                       </p:to>
                                     </p:set>
-                                    <p:animEffect transition="in" filter="blinds(horizontal)">
+                                    <p:animEffect transition="in" filter="wipe(down)">
                                       <p:cBhvr>
-                                        <p:cTn id="7" dur="500"/>
+                                        <p:cTn id="10" dur="500"/>
                                         <p:tgtEl>
                                           <p:spTgt spid="9"/>
                                         </p:tgtEl>
@@ -13101,72 +14238,34 @@
                     </p:cTn>
                   </p:par>
                   <p:par>
-                    <p:cTn id="8" fill="hold">
+                    <p:cTn id="11" fill="hold">
                       <p:stCondLst>
                         <p:cond delay="indefinite"/>
                       </p:stCondLst>
                       <p:childTnLst>
                         <p:par>
-                          <p:cTn id="9" fill="hold">
+                          <p:cTn id="12" fill="hold">
                             <p:stCondLst>
                               <p:cond delay="0"/>
                             </p:stCondLst>
                             <p:childTnLst>
                               <p:par>
-                                <p:cTn id="10" presetID="2" presetClass="exit" presetSubtype="4" fill="hold" nodeType="clickEffect">
+                                <p:cTn id="13" presetID="22" presetClass="exit" presetSubtype="4" fill="hold" nodeType="clickEffect">
                                   <p:stCondLst>
                                     <p:cond delay="0"/>
                                   </p:stCondLst>
                                   <p:childTnLst>
-                                    <p:anim calcmode="lin" valueType="num">
-                                      <p:cBhvr additive="base">
-                                        <p:cTn id="11" dur="500"/>
+                                    <p:animEffect transition="out" filter="wipe(down)">
+                                      <p:cBhvr>
+                                        <p:cTn id="14" dur="500"/>
                                         <p:tgtEl>
                                           <p:spTgt spid="10"/>
                                         </p:tgtEl>
-                                        <p:attrNameLst>
-                                          <p:attrName>ppt_x</p:attrName>
-                                        </p:attrNameLst>
                                       </p:cBhvr>
-                                      <p:tavLst>
-                                        <p:tav tm="0">
-                                          <p:val>
-                                            <p:strVal val="ppt_x"/>
-                                          </p:val>
-                                        </p:tav>
-                                        <p:tav tm="100000">
-                                          <p:val>
-                                            <p:strVal val="ppt_x"/>
-                                          </p:val>
-                                        </p:tav>
-                                      </p:tavLst>
-                                    </p:anim>
-                                    <p:anim calcmode="lin" valueType="num">
-                                      <p:cBhvr additive="base">
-                                        <p:cTn id="12" dur="500"/>
-                                        <p:tgtEl>
-                                          <p:spTgt spid="10"/>
-                                        </p:tgtEl>
-                                        <p:attrNameLst>
-                                          <p:attrName>ppt_y</p:attrName>
-                                        </p:attrNameLst>
-                                      </p:cBhvr>
-                                      <p:tavLst>
-                                        <p:tav tm="0">
-                                          <p:val>
-                                            <p:strVal val="ppt_y"/>
-                                          </p:val>
-                                        </p:tav>
-                                        <p:tav tm="100000">
-                                          <p:val>
-                                            <p:strVal val="1+ppt_h/2"/>
-                                          </p:val>
-                                        </p:tav>
-                                      </p:tavLst>
-                                    </p:anim>
+                                    </p:animEffect>
                                     <p:set>
                                       <p:cBhvr>
-                                        <p:cTn id="13" dur="1" fill="hold">
+                                        <p:cTn id="15" dur="1" fill="hold">
                                           <p:stCondLst>
                                             <p:cond delay="499"/>
                                           </p:stCondLst>
@@ -13188,27 +14287,36 @@
                             </p:childTnLst>
                           </p:cTn>
                         </p:par>
+                      </p:childTnLst>
+                    </p:cTn>
+                  </p:par>
+                  <p:par>
+                    <p:cTn id="16" fill="hold">
+                      <p:stCondLst>
+                        <p:cond delay="indefinite"/>
+                      </p:stCondLst>
+                      <p:childTnLst>
                         <p:par>
-                          <p:cTn id="14" fill="hold">
+                          <p:cTn id="17" fill="hold">
                             <p:stCondLst>
-                              <p:cond delay="500"/>
+                              <p:cond delay="0"/>
                             </p:stCondLst>
                             <p:childTnLst>
                               <p:par>
-                                <p:cTn id="15" presetID="2" presetClass="entr" presetSubtype="4" fill="hold" nodeType="afterEffect">
+                                <p:cTn id="18" presetID="22" presetClass="entr" presetSubtype="4" fill="hold" nodeType="clickEffect">
                                   <p:stCondLst>
                                     <p:cond delay="0"/>
                                   </p:stCondLst>
                                   <p:childTnLst>
                                     <p:set>
                                       <p:cBhvr>
-                                        <p:cTn id="16" dur="1" fill="hold">
+                                        <p:cTn id="19" dur="1" fill="hold">
                                           <p:stCondLst>
                                             <p:cond delay="0"/>
                                           </p:stCondLst>
                                         </p:cTn>
                                         <p:tgtEl>
-                                          <p:spTgt spid="15"/>
+                                          <p:spTgt spid="19"/>
                                         </p:tgtEl>
                                         <p:attrNameLst>
                                           <p:attrName>style.visibility</p:attrName>
@@ -13218,64 +14326,26 @@
                                         <p:strVal val="visible"/>
                                       </p:to>
                                     </p:set>
-                                    <p:anim calcmode="lin" valueType="num">
-                                      <p:cBhvr additive="base">
-                                        <p:cTn id="17" dur="500" fill="hold"/>
+                                    <p:animEffect transition="in" filter="wipe(down)">
+                                      <p:cBhvr>
+                                        <p:cTn id="20" dur="500"/>
                                         <p:tgtEl>
-                                          <p:spTgt spid="15"/>
+                                          <p:spTgt spid="19"/>
                                         </p:tgtEl>
-                                        <p:attrNameLst>
-                                          <p:attrName>ppt_x</p:attrName>
-                                        </p:attrNameLst>
                                       </p:cBhvr>
-                                      <p:tavLst>
-                                        <p:tav tm="0">
-                                          <p:val>
-                                            <p:strVal val="#ppt_x"/>
-                                          </p:val>
-                                        </p:tav>
-                                        <p:tav tm="100000">
-                                          <p:val>
-                                            <p:strVal val="#ppt_x"/>
-                                          </p:val>
-                                        </p:tav>
-                                      </p:tavLst>
-                                    </p:anim>
-                                    <p:anim calcmode="lin" valueType="num">
-                                      <p:cBhvr additive="base">
-                                        <p:cTn id="18" dur="500" fill="hold"/>
-                                        <p:tgtEl>
-                                          <p:spTgt spid="15"/>
-                                        </p:tgtEl>
-                                        <p:attrNameLst>
-                                          <p:attrName>ppt_y</p:attrName>
-                                        </p:attrNameLst>
-                                      </p:cBhvr>
-                                      <p:tavLst>
-                                        <p:tav tm="0">
-                                          <p:val>
-                                            <p:strVal val="1+#ppt_h/2"/>
-                                          </p:val>
-                                        </p:tav>
-                                        <p:tav tm="100000">
-                                          <p:val>
-                                            <p:strVal val="#ppt_y"/>
-                                          </p:val>
-                                        </p:tav>
-                                      </p:tavLst>
-                                    </p:anim>
+                                    </p:animEffect>
                                   </p:childTnLst>
                                 </p:cTn>
                               </p:par>
                               <p:par>
-                                <p:cTn id="19" presetID="2" presetClass="entr" presetSubtype="4" fill="hold" grpId="0" nodeType="withEffect">
+                                <p:cTn id="21" presetID="22" presetClass="entr" presetSubtype="4" fill="hold" grpId="0" nodeType="withEffect">
                                   <p:stCondLst>
                                     <p:cond delay="0"/>
                                   </p:stCondLst>
                                   <p:childTnLst>
                                     <p:set>
                                       <p:cBhvr>
-                                        <p:cTn id="20" dur="1" fill="hold">
+                                        <p:cTn id="22" dur="1" fill="hold">
                                           <p:stCondLst>
                                             <p:cond delay="0"/>
                                           </p:stCondLst>
@@ -13291,82 +14361,26 @@
                                         <p:strVal val="visible"/>
                                       </p:to>
                                     </p:set>
-                                    <p:anim calcmode="lin" valueType="num">
-                                      <p:cBhvr additive="base">
-                                        <p:cTn id="21" dur="500" fill="hold"/>
+                                    <p:animEffect transition="in" filter="wipe(down)">
+                                      <p:cBhvr>
+                                        <p:cTn id="23" dur="500"/>
                                         <p:tgtEl>
                                           <p:spTgt spid="14"/>
                                         </p:tgtEl>
-                                        <p:attrNameLst>
-                                          <p:attrName>ppt_x</p:attrName>
-                                        </p:attrNameLst>
                                       </p:cBhvr>
-                                      <p:tavLst>
-                                        <p:tav tm="0">
-                                          <p:val>
-                                            <p:strVal val="#ppt_x"/>
-                                          </p:val>
-                                        </p:tav>
-                                        <p:tav tm="100000">
-                                          <p:val>
-                                            <p:strVal val="#ppt_x"/>
-                                          </p:val>
-                                        </p:tav>
-                                      </p:tavLst>
-                                    </p:anim>
-                                    <p:anim calcmode="lin" valueType="num">
-                                      <p:cBhvr additive="base">
-                                        <p:cTn id="22" dur="500" fill="hold"/>
-                                        <p:tgtEl>
-                                          <p:spTgt spid="14"/>
-                                        </p:tgtEl>
-                                        <p:attrNameLst>
-                                          <p:attrName>ppt_y</p:attrName>
-                                        </p:attrNameLst>
-                                      </p:cBhvr>
-                                      <p:tavLst>
-                                        <p:tav tm="0">
-                                          <p:val>
-                                            <p:strVal val="1+#ppt_h/2"/>
-                                          </p:val>
-                                        </p:tav>
-                                        <p:tav tm="100000">
-                                          <p:val>
-                                            <p:strVal val="#ppt_y"/>
-                                          </p:val>
-                                        </p:tav>
-                                      </p:tavLst>
-                                    </p:anim>
+                                    </p:animEffect>
                                   </p:childTnLst>
                                 </p:cTn>
                               </p:par>
-                            </p:childTnLst>
-                          </p:cTn>
-                        </p:par>
-                      </p:childTnLst>
-                    </p:cTn>
-                  </p:par>
-                  <p:par>
-                    <p:cTn id="23" fill="hold">
-                      <p:stCondLst>
-                        <p:cond delay="indefinite"/>
-                      </p:stCondLst>
-                      <p:childTnLst>
-                        <p:par>
-                          <p:cTn id="24" fill="hold">
-                            <p:stCondLst>
-                              <p:cond delay="0"/>
-                            </p:stCondLst>
-                            <p:childTnLst>
                               <p:par>
-                                <p:cTn id="25" presetID="3" presetClass="entr" presetSubtype="10" fill="hold" grpId="0" nodeType="clickEffect">
+                                <p:cTn id="24" presetID="22" presetClass="entr" presetSubtype="4" fill="hold" grpId="0" nodeType="withEffect">
                                   <p:stCondLst>
                                     <p:cond delay="0"/>
                                   </p:stCondLst>
                                   <p:childTnLst>
                                     <p:set>
                                       <p:cBhvr>
-                                        <p:cTn id="26" dur="1" fill="hold">
+                                        <p:cTn id="25" dur="1" fill="hold">
                                           <p:stCondLst>
                                             <p:cond delay="0"/>
                                           </p:stCondLst>
@@ -13382,9 +14396,9 @@
                                         <p:strVal val="visible"/>
                                       </p:to>
                                     </p:set>
-                                    <p:animEffect transition="in" filter="blinds(horizontal)">
+                                    <p:animEffect transition="in" filter="wipe(down)">
                                       <p:cBhvr>
-                                        <p:cTn id="27" dur="500"/>
+                                        <p:cTn id="26" dur="500"/>
                                         <p:tgtEl>
                                           <p:spTgt spid="2"/>
                                         </p:tgtEl>
@@ -13400,40 +14414,40 @@
                     </p:cTn>
                   </p:par>
                   <p:par>
-                    <p:cTn id="28" fill="hold">
+                    <p:cTn id="27" fill="hold">
                       <p:stCondLst>
                         <p:cond delay="indefinite"/>
                       </p:stCondLst>
                       <p:childTnLst>
                         <p:par>
-                          <p:cTn id="29" fill="hold">
+                          <p:cTn id="28" fill="hold">
                             <p:stCondLst>
                               <p:cond delay="0"/>
                             </p:stCondLst>
                             <p:childTnLst>
                               <p:par>
-                                <p:cTn id="30" presetID="21" presetClass="exit" presetSubtype="1" fill="hold" nodeType="clickEffect">
+                                <p:cTn id="29" presetID="3" presetClass="exit" presetSubtype="10" fill="hold" nodeType="clickEffect">
                                   <p:stCondLst>
                                     <p:cond delay="0"/>
                                   </p:stCondLst>
                                   <p:childTnLst>
-                                    <p:animEffect transition="out" filter="wheel(1)">
+                                    <p:animEffect transition="out" filter="blinds(horizontal)">
                                       <p:cBhvr>
-                                        <p:cTn id="31" dur="1000"/>
+                                        <p:cTn id="30" dur="500"/>
                                         <p:tgtEl>
-                                          <p:spTgt spid="15"/>
+                                          <p:spTgt spid="19"/>
                                         </p:tgtEl>
                                       </p:cBhvr>
                                     </p:animEffect>
                                     <p:set>
                                       <p:cBhvr>
-                                        <p:cTn id="32" dur="1" fill="hold">
+                                        <p:cTn id="31" dur="1" fill="hold">
                                           <p:stCondLst>
-                                            <p:cond delay="999"/>
+                                            <p:cond delay="499"/>
                                           </p:stCondLst>
                                         </p:cTn>
                                         <p:tgtEl>
-                                          <p:spTgt spid="15"/>
+                                          <p:spTgt spid="19"/>
                                         </p:tgtEl>
                                         <p:attrNameLst>
                                           <p:attrName>style.visibility</p:attrName>
@@ -13447,81 +14461,28 @@
                                 </p:cTn>
                               </p:par>
                               <p:par>
-                                <p:cTn id="33" presetID="18" presetClass="entr" presetSubtype="12" fill="hold" nodeType="withEffect">
+                                <p:cTn id="32" presetID="3" presetClass="exit" presetSubtype="10" fill="hold" grpId="1" nodeType="withEffect">
                                   <p:stCondLst>
                                     <p:cond delay="0"/>
                                   </p:stCondLst>
                                   <p:childTnLst>
-                                    <p:set>
+                                    <p:animEffect transition="out" filter="blinds(horizontal)">
                                       <p:cBhvr>
-                                        <p:cTn id="34" dur="1" fill="hold">
-                                          <p:stCondLst>
-                                            <p:cond delay="0"/>
-                                          </p:stCondLst>
-                                        </p:cTn>
+                                        <p:cTn id="33" dur="500"/>
                                         <p:tgtEl>
-                                          <p:spTgt spid="4"/>
-                                        </p:tgtEl>
-                                        <p:attrNameLst>
-                                          <p:attrName>style.visibility</p:attrName>
-                                        </p:attrNameLst>
-                                      </p:cBhvr>
-                                      <p:to>
-                                        <p:strVal val="visible"/>
-                                      </p:to>
-                                    </p:set>
-                                    <p:animEffect transition="in" filter="strips(downLeft)">
-                                      <p:cBhvr>
-                                        <p:cTn id="35" dur="500"/>
-                                        <p:tgtEl>
-                                          <p:spTgt spid="4"/>
-                                        </p:tgtEl>
-                                      </p:cBhvr>
-                                    </p:animEffect>
-                                  </p:childTnLst>
-                                </p:cTn>
-                              </p:par>
-                            </p:childTnLst>
-                          </p:cTn>
-                        </p:par>
-                      </p:childTnLst>
-                    </p:cTn>
-                  </p:par>
-                  <p:par>
-                    <p:cTn id="36" fill="hold">
-                      <p:stCondLst>
-                        <p:cond delay="indefinite"/>
-                      </p:stCondLst>
-                      <p:childTnLst>
-                        <p:par>
-                          <p:cTn id="37" fill="hold">
-                            <p:stCondLst>
-                              <p:cond delay="0"/>
-                            </p:stCondLst>
-                            <p:childTnLst>
-                              <p:par>
-                                <p:cTn id="38" presetID="21" presetClass="exit" presetSubtype="1" fill="hold" grpId="1" nodeType="clickEffect">
-                                  <p:stCondLst>
-                                    <p:cond delay="0"/>
-                                  </p:stCondLst>
-                                  <p:childTnLst>
-                                    <p:animEffect transition="out" filter="wheel(1)">
-                                      <p:cBhvr>
-                                        <p:cTn id="39" dur="500"/>
-                                        <p:tgtEl>
-                                          <p:spTgt spid="2"/>
+                                          <p:spTgt spid="14"/>
                                         </p:tgtEl>
                                       </p:cBhvr>
                                     </p:animEffect>
                                     <p:set>
                                       <p:cBhvr>
-                                        <p:cTn id="40" dur="1" fill="hold">
+                                        <p:cTn id="34" dur="1" fill="hold">
                                           <p:stCondLst>
-                                            <p:cond delay="500"/>
+                                            <p:cond delay="499"/>
                                           </p:stCondLst>
                                         </p:cTn>
                                         <p:tgtEl>
-                                          <p:spTgt spid="2"/>
+                                          <p:spTgt spid="14"/>
                                         </p:tgtEl>
                                         <p:attrNameLst>
                                           <p:attrName>style.visibility</p:attrName>
@@ -13535,28 +14496,28 @@
                                 </p:cTn>
                               </p:par>
                               <p:par>
-                                <p:cTn id="41" presetID="21" presetClass="exit" presetSubtype="1" fill="hold" nodeType="withEffect">
+                                <p:cTn id="35" presetID="3" presetClass="exit" presetSubtype="10" fill="hold" grpId="1" nodeType="withEffect">
                                   <p:stCondLst>
                                     <p:cond delay="0"/>
                                   </p:stCondLst>
                                   <p:childTnLst>
-                                    <p:animEffect transition="out" filter="wheel(1)">
+                                    <p:animEffect transition="out" filter="blinds(horizontal)">
                                       <p:cBhvr>
-                                        <p:cTn id="42" dur="500"/>
+                                        <p:cTn id="36" dur="500"/>
                                         <p:tgtEl>
-                                          <p:spTgt spid="4"/>
+                                          <p:spTgt spid="2"/>
                                         </p:tgtEl>
                                       </p:cBhvr>
                                     </p:animEffect>
                                     <p:set>
                                       <p:cBhvr>
-                                        <p:cTn id="43" dur="1" fill="hold">
+                                        <p:cTn id="37" dur="1" fill="hold">
                                           <p:stCondLst>
-                                            <p:cond delay="500"/>
+                                            <p:cond delay="499"/>
                                           </p:stCondLst>
                                         </p:cTn>
                                         <p:tgtEl>
-                                          <p:spTgt spid="4"/>
+                                          <p:spTgt spid="2"/>
                                         </p:tgtEl>
                                         <p:attrNameLst>
                                           <p:attrName>style.visibility</p:attrName>
@@ -13576,19 +14537,89 @@
                     </p:cTn>
                   </p:par>
                   <p:par>
-                    <p:cTn id="44" fill="hold">
+                    <p:cTn id="38" fill="hold">
                       <p:stCondLst>
                         <p:cond delay="indefinite"/>
                       </p:stCondLst>
                       <p:childTnLst>
                         <p:par>
-                          <p:cTn id="45" fill="hold">
+                          <p:cTn id="39" fill="hold">
                             <p:stCondLst>
                               <p:cond delay="0"/>
                             </p:stCondLst>
                             <p:childTnLst>
                               <p:par>
-                                <p:cTn id="46" presetID="3" presetClass="entr" presetSubtype="10" fill="hold" grpId="0" nodeType="clickEffect">
+                                <p:cTn id="40" presetID="3" presetClass="entr" presetSubtype="10" fill="hold" grpId="2" nodeType="clickEffect">
+                                  <p:stCondLst>
+                                    <p:cond delay="0"/>
+                                  </p:stCondLst>
+                                  <p:childTnLst>
+                                    <p:set>
+                                      <p:cBhvr>
+                                        <p:cTn id="41" dur="1" fill="hold">
+                                          <p:stCondLst>
+                                            <p:cond delay="0"/>
+                                          </p:stCondLst>
+                                        </p:cTn>
+                                        <p:tgtEl>
+                                          <p:spTgt spid="22"/>
+                                        </p:tgtEl>
+                                        <p:attrNameLst>
+                                          <p:attrName>style.visibility</p:attrName>
+                                        </p:attrNameLst>
+                                      </p:cBhvr>
+                                      <p:to>
+                                        <p:strVal val="visible"/>
+                                      </p:to>
+                                    </p:set>
+                                    <p:animEffect transition="in" filter="blinds(horizontal)">
+                                      <p:cBhvr>
+                                        <p:cTn id="42" dur="500"/>
+                                        <p:tgtEl>
+                                          <p:spTgt spid="22"/>
+                                        </p:tgtEl>
+                                      </p:cBhvr>
+                                    </p:animEffect>
+                                  </p:childTnLst>
+                                </p:cTn>
+                              </p:par>
+                              <p:par>
+                                <p:cTn id="43" presetID="3" presetClass="entr" presetSubtype="10" fill="hold" nodeType="withEffect">
+                                  <p:stCondLst>
+                                    <p:cond delay="0"/>
+                                  </p:stCondLst>
+                                  <p:childTnLst>
+                                    <p:set>
+                                      <p:cBhvr>
+                                        <p:cTn id="44" dur="1" fill="hold">
+                                          <p:stCondLst>
+                                            <p:cond delay="0"/>
+                                          </p:stCondLst>
+                                        </p:cTn>
+                                        <p:tgtEl>
+                                          <p:spTgt spid="20"/>
+                                        </p:tgtEl>
+                                        <p:attrNameLst>
+                                          <p:attrName>style.visibility</p:attrName>
+                                        </p:attrNameLst>
+                                      </p:cBhvr>
+                                      <p:to>
+                                        <p:strVal val="visible"/>
+                                      </p:to>
+                                    </p:set>
+                                    <p:animEffect transition="in" filter="blinds(horizontal)">
+                                      <p:cBhvr>
+                                        <p:cTn id="45" dur="500"/>
+                                        <p:tgtEl>
+                                          <p:spTgt spid="20"/>
+                                        </p:tgtEl>
+                                      </p:cBhvr>
+                                    </p:animEffect>
+                                  </p:childTnLst>
+                                </p:cTn>
+                              </p:par>
+                              <p:par>
+                                <p:cTn id="46" presetID="3" presetClass="entr" presetSubtype="10" fill="hold" grpId="0" nodeType="withEffect">
                                   <p:stCondLst>
                                     <p:cond delay="0"/>
                                   </p:stCondLst>
@@ -13641,81 +14672,63 @@
                             </p:stCondLst>
                             <p:childTnLst>
                               <p:par>
-                                <p:cTn id="51" presetID="22" presetClass="entr" presetSubtype="4" fill="hold" nodeType="clickEffect">
+                                <p:cTn id="51" presetID="3" presetClass="exit" presetSubtype="10" fill="hold" grpId="3" nodeType="clickEffect">
                                   <p:stCondLst>
                                     <p:cond delay="0"/>
                                   </p:stCondLst>
                                   <p:childTnLst>
+                                    <p:animEffect transition="out" filter="blinds(horizontal)">
+                                      <p:cBhvr>
+                                        <p:cTn id="52" dur="500"/>
+                                        <p:tgtEl>
+                                          <p:spTgt spid="22"/>
+                                        </p:tgtEl>
+                                      </p:cBhvr>
+                                    </p:animEffect>
                                     <p:set>
                                       <p:cBhvr>
-                                        <p:cTn id="52" dur="1" fill="hold">
+                                        <p:cTn id="53" dur="1" fill="hold">
                                           <p:stCondLst>
-                                            <p:cond delay="0"/>
+                                            <p:cond delay="499"/>
                                           </p:stCondLst>
                                         </p:cTn>
                                         <p:tgtEl>
-                                          <p:spTgt spid="12"/>
+                                          <p:spTgt spid="22"/>
                                         </p:tgtEl>
                                         <p:attrNameLst>
                                           <p:attrName>style.visibility</p:attrName>
                                         </p:attrNameLst>
                                       </p:cBhvr>
                                       <p:to>
-                                        <p:strVal val="visible"/>
+                                        <p:strVal val="hidden"/>
                                       </p:to>
                                     </p:set>
-                                    <p:animEffect transition="in" filter="wipe(down)">
-                                      <p:cBhvr>
-                                        <p:cTn id="53" dur="500"/>
-                                        <p:tgtEl>
-                                          <p:spTgt spid="12"/>
-                                        </p:tgtEl>
-                                      </p:cBhvr>
-                                    </p:animEffect>
                                   </p:childTnLst>
                                 </p:cTn>
                               </p:par>
-                            </p:childTnLst>
-                          </p:cTn>
-                        </p:par>
-                      </p:childTnLst>
-                    </p:cTn>
-                  </p:par>
-                  <p:par>
-                    <p:cTn id="54" fill="hold">
-                      <p:stCondLst>
-                        <p:cond delay="indefinite"/>
-                      </p:stCondLst>
-                      <p:childTnLst>
-                        <p:par>
-                          <p:cTn id="55" fill="hold">
-                            <p:stCondLst>
-                              <p:cond delay="0"/>
-                            </p:stCondLst>
-                            <p:childTnLst>
                               <p:par>
-                                <p:cTn id="56" presetID="22" presetClass="exit" presetSubtype="4" fill="hold" nodeType="clickEffect">
+                                <p:cTn id="54" presetID="3" presetClass="exit" presetSubtype="10" fill="hold" nodeType="withEffect">
                                   <p:stCondLst>
                                     <p:cond delay="0"/>
                                   </p:stCondLst>
                                   <p:childTnLst>
-                                    <p:animEffect transition="out" filter="wipe(down)">
+                                    <p:animEffect transition="out" filter="blinds(horizontal)">
                                       <p:cBhvr>
-                                        <p:cTn id="57" dur="500"/>
+                                        <p:cTn id="55" dur="500"/>
                                         <p:tgtEl>
-                                          <p:spTgt spid="12"/>
+                                          <p:spTgt spid="20"/>
                                         </p:tgtEl>
                                       </p:cBhvr>
                                     </p:animEffect>
                                     <p:set>
                                       <p:cBhvr>
-                                        <p:cTn id="58" dur="1" fill="hold">
+                                        <p:cTn id="56" dur="1" fill="hold">
                                           <p:stCondLst>
                                             <p:cond delay="499"/>
                                           </p:stCondLst>
                                         </p:cTn>
                                         <p:tgtEl>
-                                          <p:spTgt spid="12"/>
+                                          <p:spTgt spid="20"/>
                                         </p:tgtEl>
                                         <p:attrNameLst>
                                           <p:attrName>style.visibility</p:attrName>
@@ -13735,32 +14748,32 @@
                     </p:cTn>
                   </p:par>
                   <p:par>
-                    <p:cTn id="59" fill="hold">
+                    <p:cTn id="57" fill="hold">
                       <p:stCondLst>
                         <p:cond delay="indefinite"/>
                       </p:stCondLst>
                       <p:childTnLst>
                         <p:par>
-                          <p:cTn id="60" fill="hold">
+                          <p:cTn id="58" fill="hold">
                             <p:stCondLst>
                               <p:cond delay="0"/>
                             </p:stCondLst>
                             <p:childTnLst>
                               <p:par>
-                                <p:cTn id="61" presetID="4" presetClass="entr" presetSubtype="16" fill="hold" nodeType="clickEffect">
+                                <p:cTn id="59" presetID="3" presetClass="entr" presetSubtype="10" fill="hold" nodeType="clickEffect">
                                   <p:stCondLst>
                                     <p:cond delay="0"/>
                                   </p:stCondLst>
                                   <p:childTnLst>
                                     <p:set>
                                       <p:cBhvr>
-                                        <p:cTn id="62" dur="500" fill="hold">
+                                        <p:cTn id="60" dur="1" fill="hold">
                                           <p:stCondLst>
                                             <p:cond delay="0"/>
                                           </p:stCondLst>
                                         </p:cTn>
                                         <p:tgtEl>
-                                          <p:spTgt spid="11"/>
+                                          <p:spTgt spid="24"/>
                                         </p:tgtEl>
                                         <p:attrNameLst>
                                           <p:attrName>style.visibility</p:attrName>
@@ -13770,11 +14783,46 @@
                                         <p:strVal val="visible"/>
                                       </p:to>
                                     </p:set>
-                                    <p:animEffect transition="in" filter="box(in)">
+                                    <p:animEffect transition="in" filter="blinds(horizontal)">
                                       <p:cBhvr>
-                                        <p:cTn id="63" dur="500"/>
+                                        <p:cTn id="61" dur="500"/>
                                         <p:tgtEl>
-                                          <p:spTgt spid="11"/>
+                                          <p:spTgt spid="24"/>
+                                        </p:tgtEl>
+                                      </p:cBhvr>
+                                    </p:animEffect>
+                                  </p:childTnLst>
+                                </p:cTn>
+                              </p:par>
+                              <p:par>
+                                <p:cTn id="62" presetID="3" presetClass="entr" presetSubtype="10" fill="hold" grpId="4" nodeType="withEffect">
+                                  <p:stCondLst>
+                                    <p:cond delay="0"/>
+                                  </p:stCondLst>
+                                  <p:childTnLst>
+                                    <p:set>
+                                      <p:cBhvr>
+                                        <p:cTn id="63" dur="1" fill="hold">
+                                          <p:stCondLst>
+                                            <p:cond delay="0"/>
+                                          </p:stCondLst>
+                                        </p:cTn>
+                                        <p:tgtEl>
+                                          <p:spTgt spid="23"/>
+                                        </p:tgtEl>
+                                        <p:attrNameLst>
+                                          <p:attrName>style.visibility</p:attrName>
+                                        </p:attrNameLst>
+                                      </p:cBhvr>
+                                      <p:to>
+                                        <p:strVal val="visible"/>
+                                      </p:to>
+                                    </p:set>
+                                    <p:animEffect transition="in" filter="blinds(horizontal)">
+                                      <p:cBhvr>
+                                        <p:cTn id="64" dur="500"/>
+                                        <p:tgtEl>
+                                          <p:spTgt spid="23"/>
                                         </p:tgtEl>
                                       </p:cBhvr>
                                     </p:animEffect>
@@ -13811,10 +14859,156 @@
     <p:bldLst>
       <p:bldP spid="14" grpId="0"/>
       <p:bldP spid="2" grpId="0"/>
+      <p:bldP spid="14" grpId="1"/>
       <p:bldP spid="2" grpId="1"/>
+      <p:bldP spid="22" grpId="2"/>
+      <p:bldP spid="22" grpId="3"/>
+      <p:bldP spid="23" grpId="4"/>
       <p:bldP spid="8" grpId="0"/>
     </p:bldLst>
   </p:timing>
+</p:sld>
+</file>
+
+<file path=ppt/slides/slide9.xml><?xml version="1.0" encoding="utf-8"?>
+<p:sld xmlns:a="http://schemas.openxmlformats.org/drawingml/2006/main" xmlns:r="http://schemas.openxmlformats.org/officeDocument/2006/relationships" xmlns:p="http://schemas.openxmlformats.org/presentationml/2006/main">
+  <p:cSld>
+    <p:spTree>
+      <p:nvGrpSpPr>
+        <p:cNvPr id="1" name=""/>
+        <p:cNvGrpSpPr/>
+        <p:nvPr/>
+      </p:nvGrpSpPr>
+      <p:grpSpPr/>
+      <p:sp>
+        <p:nvSpPr>
+          <p:cNvPr id="4" name="文本框 3"/>
+          <p:cNvSpPr txBox="1"/>
+          <p:nvPr/>
+        </p:nvSpPr>
+        <p:spPr>
+          <a:xfrm>
+            <a:off x="387350" y="259080"/>
+            <a:ext cx="3891280" cy="460375"/>
+          </a:xfrm>
+          <a:prstGeom prst="rect">
+            <a:avLst/>
+          </a:prstGeom>
+          <a:noFill/>
+        </p:spPr>
+        <p:txBody>
+          <a:bodyPr wrap="square" rtlCol="0">
+            <a:spAutoFit/>
+          </a:bodyPr>
+          <a:p>
+            <a:r>
+              <a:rPr lang="en-US" altLang="zh-CN" sz="2400" b="1"/>
+              <a:t>Simulation model</a:t>
+            </a:r>
+            <a:endParaRPr lang="en-US" altLang="zh-CN" sz="2400" b="1"/>
+          </a:p>
+        </p:txBody>
+      </p:sp>
+      <p:sp>
+        <p:nvSpPr>
+          <p:cNvPr id="6" name="文本框 5"/>
+          <p:cNvSpPr txBox="1"/>
+          <p:nvPr/>
+        </p:nvSpPr>
+        <p:spPr>
+          <a:xfrm>
+            <a:off x="387350" y="845185"/>
+            <a:ext cx="4656455" cy="5631180"/>
+          </a:xfrm>
+          <a:prstGeom prst="rect">
+            <a:avLst/>
+          </a:prstGeom>
+          <a:noFill/>
+        </p:spPr>
+        <p:txBody>
+          <a:bodyPr wrap="square" rtlCol="0">
+            <a:spAutoFit/>
+          </a:bodyPr>
+          <a:p>
+            <a:pPr marL="342900" indent="-342900">
+              <a:buFont typeface="Arial" panose="020B0604020202020204" pitchFamily="34" charset="0"/>
+              <a:buChar char="•"/>
+            </a:pPr>
+            <a:r>
+              <a:rPr lang="en-US" altLang="zh-CN" sz="2000"/>
+              <a:t>There are 16 nodes in total in the system. </a:t>
+            </a:r>
+            <a:endParaRPr lang="en-US" altLang="zh-CN" sz="2000"/>
+          </a:p>
+          <a:p>
+            <a:pPr marL="342900" indent="-342900">
+              <a:buFont typeface="Arial" panose="020B0604020202020204" pitchFamily="34" charset="0"/>
+              <a:buChar char="•"/>
+            </a:pPr>
+            <a:r>
+              <a:rPr lang="en-US" altLang="zh-CN" sz="2000"/>
+              <a:t>There is only one attacker in the system. He owns one laptop and one exploited mobile device(malicious node). </a:t>
+            </a:r>
+            <a:endParaRPr lang="en-US" altLang="zh-CN" sz="2000"/>
+          </a:p>
+          <a:p>
+            <a:pPr marL="342900" indent="-342900">
+              <a:buFont typeface="Arial" panose="020B0604020202020204" pitchFamily="34" charset="0"/>
+              <a:buChar char="•"/>
+            </a:pPr>
+            <a:r>
+              <a:rPr lang="en-US" altLang="zh-CN" sz="2000">
+                <a:solidFill>
+                  <a:srgbClr val="FF0000"/>
+                </a:solidFill>
+              </a:rPr>
+              <a:t>The malicious node will only help Sybil nodes broadcast when it's vacant. The laptop can broadcast on behalf of discretionary number of Sybil nodes.</a:t>
+            </a:r>
+            <a:endParaRPr lang="en-US" altLang="zh-CN" sz="2000"/>
+          </a:p>
+          <a:p>
+            <a:pPr marL="342900" indent="-342900">
+              <a:buFont typeface="Arial" panose="020B0604020202020204" pitchFamily="34" charset="0"/>
+              <a:buChar char="•"/>
+            </a:pPr>
+            <a:r>
+              <a:rPr lang="en-US" altLang="zh-CN" sz="2000"/>
+              <a:t>When two evil nodes are paired as a sentry, they will definitely vote out broadcasting honest nodes.</a:t>
+            </a:r>
+            <a:endParaRPr lang="en-US" altLang="zh-CN" sz="2000"/>
+          </a:p>
+          <a:p>
+            <a:pPr marL="342900" indent="-342900">
+              <a:buFont typeface="Arial" panose="020B0604020202020204" pitchFamily="34" charset="0"/>
+              <a:buChar char="•"/>
+            </a:pPr>
+            <a:r>
+              <a:rPr lang="en-US" altLang="zh-CN" sz="2000"/>
+              <a:t>There are 6 evil nodes in the system(one malicious node and five Sybil nodes).</a:t>
+            </a:r>
+            <a:endParaRPr lang="en-US" altLang="zh-CN" sz="2000"/>
+          </a:p>
+          <a:p>
+            <a:pPr marL="342900" indent="-342900">
+              <a:buFont typeface="Arial" panose="020B0604020202020204" pitchFamily="34" charset="0"/>
+              <a:buChar char="•"/>
+            </a:pPr>
+            <a:r>
+              <a:rPr lang="en-US" altLang="zh-CN" sz="2000"/>
+              <a:t>The emulation runs 2000 times.</a:t>
+            </a:r>
+            <a:endParaRPr lang="en-US" altLang="zh-CN" sz="2000"/>
+          </a:p>
+        </p:txBody>
+      </p:sp>
+    </p:spTree>
+    <p:custDataLst>
+      <p:tags r:id="rId1"/>
+    </p:custDataLst>
+  </p:cSld>
+  <p:clrMapOvr>
+    <a:masterClrMapping/>
+  </p:clrMapOvr>
 </p:sld>
 </file>
 
@@ -14680,21 +15874,21 @@
 
 <file path=ppt/tags/tag71.xml><?xml version="1.0" encoding="utf-8"?>
 <p:tagLst xmlns:p="http://schemas.openxmlformats.org/presentationml/2006/main">
-  <p:tag name="KSO_WM_BEAUTIFY_FLAG" val="#wm#"/>
-  <p:tag name="KSO_WM_TEMPLATE_CATEGORY" val="custom"/>
-  <p:tag name="KSO_WM_TEMPLATE_INDEX" val="20205176"/>
+  <p:tag name="KSO_WM_UNIT_TABLE_BEAUTIFY" val="smartTable{07f92b84-91b1-4e43-8716-d7ed4c3905b7}"/>
 </p:tagLst>
 </file>
 
 <file path=ppt/tags/tag72.xml><?xml version="1.0" encoding="utf-8"?>
 <p:tagLst xmlns:p="http://schemas.openxmlformats.org/presentationml/2006/main">
-  <p:tag name="KSO_WM_UNIT_TABLE_BEAUTIFY" val="smartTable{07f92b84-91b1-4e43-8716-d7ed4c3905b7}"/>
+  <p:tag name="KSO_WM_UNIT_TABLE_BEAUTIFY" val="smartTable{aa3b5882-6b5e-47b7-a849-cb99225c4ce8}"/>
 </p:tagLst>
 </file>
 
 <file path=ppt/tags/tag73.xml><?xml version="1.0" encoding="utf-8"?>
 <p:tagLst xmlns:p="http://schemas.openxmlformats.org/presentationml/2006/main">
-  <p:tag name="KSO_WM_UNIT_TABLE_BEAUTIFY" val="smartTable{aa3b5882-6b5e-47b7-a849-cb99225c4ce8}"/>
+  <p:tag name="KSO_WM_BEAUTIFY_FLAG" val="#wm#"/>
+  <p:tag name="KSO_WM_TEMPLATE_CATEGORY" val="custom"/>
+  <p:tag name="KSO_WM_TEMPLATE_INDEX" val="20205176"/>
 </p:tagLst>
 </file>
 
@@ -14708,19 +15902,11 @@
 
 <file path=ppt/tags/tag75.xml><?xml version="1.0" encoding="utf-8"?>
 <p:tagLst xmlns:p="http://schemas.openxmlformats.org/presentationml/2006/main">
-  <p:tag name="KSO_WM_BEAUTIFY_FLAG" val="#wm#"/>
-  <p:tag name="KSO_WM_TEMPLATE_CATEGORY" val="custom"/>
-  <p:tag name="KSO_WM_TEMPLATE_INDEX" val="20205176"/>
+  <p:tag name="KSO_WM_UNIT_TABLE_BEAUTIFY" val="smartTable{aa3b5882-6b5e-47b7-a849-cb99225c4ce8}"/>
 </p:tagLst>
 </file>
 
 <file path=ppt/tags/tag76.xml><?xml version="1.0" encoding="utf-8"?>
-<p:tagLst xmlns:p="http://schemas.openxmlformats.org/presentationml/2006/main">
-  <p:tag name="KSO_WM_UNIT_TABLE_BEAUTIFY" val="smartTable{aa3b5882-6b5e-47b7-a849-cb99225c4ce8}"/>
-</p:tagLst>
-</file>
-
-<file path=ppt/tags/tag77.xml><?xml version="1.0" encoding="utf-8"?>
 <p:tagLst xmlns:p="http://schemas.openxmlformats.org/presentationml/2006/main">
   <p:tag name="KSO_WM_BEAUTIFY_FLAG" val="#wm#"/>
   <p:tag name="KSO_WM_TEMPLATE_CATEGORY" val="custom"/>
@@ -14728,9 +15914,17 @@
 </p:tagLst>
 </file>
 
+<file path=ppt/tags/tag77.xml><?xml version="1.0" encoding="utf-8"?>
+<p:tagLst xmlns:p="http://schemas.openxmlformats.org/presentationml/2006/main">
+  <p:tag name="KSO_WM_UNIT_TABLE_BEAUTIFY" val="smartTable{aa3b5882-6b5e-47b7-a849-cb99225c4ce8}"/>
+</p:tagLst>
+</file>
+
 <file path=ppt/tags/tag78.xml><?xml version="1.0" encoding="utf-8"?>
 <p:tagLst xmlns:p="http://schemas.openxmlformats.org/presentationml/2006/main">
-  <p:tag name="KSO_WM_UNIT_TABLE_BEAUTIFY" val="smartTable{aa3b5882-6b5e-47b7-a849-cb99225c4ce8}"/>
+  <p:tag name="KSO_WM_BEAUTIFY_FLAG" val="#wm#"/>
+  <p:tag name="KSO_WM_TEMPLATE_CATEGORY" val="custom"/>
+  <p:tag name="KSO_WM_TEMPLATE_INDEX" val="20205176"/>
 </p:tagLst>
 </file>
 
@@ -14752,14 +15946,6 @@
   <p:tag name="KSO_WM_UNIT_LAYERLEVEL" val="1"/>
   <p:tag name="KSO_WM_TAG_VERSION" val="1.0"/>
   <p:tag name="KSO_WM_BEAUTIFY_FLAG" val="#wm#"/>
-</p:tagLst>
-</file>
-
-<file path=ppt/tags/tag80.xml><?xml version="1.0" encoding="utf-8"?>
-<p:tagLst xmlns:p="http://schemas.openxmlformats.org/presentationml/2006/main">
-  <p:tag name="KSO_WM_BEAUTIFY_FLAG" val="#wm#"/>
-  <p:tag name="KSO_WM_TEMPLATE_CATEGORY" val="custom"/>
-  <p:tag name="KSO_WM_TEMPLATE_INDEX" val="20205176"/>
 </p:tagLst>
 </file>
 

</xml_diff>